<commit_message>
minor improvements/additions to mod3 and assoc resources
</commit_message>
<xml_diff>
--- a/LectureFiles/cbw/2017/RNASeq_Module3_Lecture.pptx
+++ b/LectureFiles/cbw/2017/RNASeq_Module3_Lecture.pptx
@@ -5,10 +5,10 @@
     <p:sldMasterId id="2147483648" r:id="rId1"/>
   </p:sldMasterIdLst>
   <p:notesMasterIdLst>
-    <p:notesMasterId r:id="rId25"/>
+    <p:notesMasterId r:id="rId28"/>
   </p:notesMasterIdLst>
   <p:handoutMasterIdLst>
-    <p:handoutMasterId r:id="rId26"/>
+    <p:handoutMasterId r:id="rId29"/>
   </p:handoutMasterIdLst>
   <p:sldIdLst>
     <p:sldId id="341" r:id="rId2"/>
@@ -20,20 +20,23 @@
     <p:sldId id="516" r:id="rId8"/>
     <p:sldId id="517" r:id="rId9"/>
     <p:sldId id="518" r:id="rId10"/>
-    <p:sldId id="519" r:id="rId11"/>
-    <p:sldId id="520" r:id="rId12"/>
-    <p:sldId id="521" r:id="rId13"/>
-    <p:sldId id="522" r:id="rId14"/>
-    <p:sldId id="523" r:id="rId15"/>
-    <p:sldId id="524" r:id="rId16"/>
-    <p:sldId id="525" r:id="rId17"/>
-    <p:sldId id="526" r:id="rId18"/>
-    <p:sldId id="527" r:id="rId19"/>
-    <p:sldId id="528" r:id="rId20"/>
-    <p:sldId id="529" r:id="rId21"/>
-    <p:sldId id="530" r:id="rId22"/>
-    <p:sldId id="531" r:id="rId23"/>
-    <p:sldId id="512" r:id="rId24"/>
+    <p:sldId id="532" r:id="rId11"/>
+    <p:sldId id="533" r:id="rId12"/>
+    <p:sldId id="519" r:id="rId13"/>
+    <p:sldId id="520" r:id="rId14"/>
+    <p:sldId id="521" r:id="rId15"/>
+    <p:sldId id="522" r:id="rId16"/>
+    <p:sldId id="523" r:id="rId17"/>
+    <p:sldId id="534" r:id="rId18"/>
+    <p:sldId id="525" r:id="rId19"/>
+    <p:sldId id="524" r:id="rId20"/>
+    <p:sldId id="526" r:id="rId21"/>
+    <p:sldId id="527" r:id="rId22"/>
+    <p:sldId id="528" r:id="rId23"/>
+    <p:sldId id="529" r:id="rId24"/>
+    <p:sldId id="530" r:id="rId25"/>
+    <p:sldId id="531" r:id="rId26"/>
+    <p:sldId id="512" r:id="rId27"/>
   </p:sldIdLst>
   <p:sldSz cx="9144000" cy="6858000" type="screen4x3"/>
   <p:notesSz cx="7315200" cy="9601200"/>
@@ -272,7 +275,7 @@
               <a:pPr>
                 <a:defRPr/>
               </a:pPr>
-              <a:t>7/10/17</a:t>
+              <a:t>7/11/17</a:t>
             </a:fld>
             <a:endParaRPr lang="en-US"/>
           </a:p>
@@ -487,7 +490,7 @@
               <a:pPr>
                 <a:defRPr/>
               </a:pPr>
-              <a:t>7/10/17</a:t>
+              <a:t>7/11/17</a:t>
             </a:fld>
             <a:endParaRPr lang="en-US"/>
           </a:p>
@@ -1308,65 +1311,131 @@
           <a:bodyPr/>
           <a:lstStyle/>
           <a:p>
+            <a:pPr marL="228600" indent="-228600">
+              <a:buAutoNum type="alphaLcParenBoth"/>
+            </a:pPr>
+            <a:r>
+              <a:rPr lang="en-US" dirty="0" smtClean="0"/>
+              <a:t>Overview </a:t>
+            </a:r>
+            <a:r>
+              <a:rPr lang="en-US" dirty="0" smtClean="0"/>
+              <a:t>of the flow of the </a:t>
+            </a:r>
+            <a:r>
+              <a:rPr lang="en-US" dirty="0" err="1" smtClean="0"/>
+              <a:t>StringTie</a:t>
+            </a:r>
+            <a:r>
+              <a:rPr lang="en-US" dirty="0" smtClean="0"/>
+              <a:t> algorithm, compared to Cufflinks and </a:t>
+            </a:r>
+            <a:r>
+              <a:rPr lang="en-US" dirty="0" err="1" smtClean="0"/>
+              <a:t>Traph</a:t>
+            </a:r>
+            <a:r>
+              <a:rPr lang="en-US" dirty="0" smtClean="0"/>
+              <a:t>. </a:t>
+            </a:r>
+            <a:endParaRPr lang="en-US" dirty="0" smtClean="0"/>
+          </a:p>
+          <a:p>
+            <a:pPr marL="228600" indent="-228600">
+              <a:buAutoNum type="alphaLcParenBoth"/>
+            </a:pPr>
+            <a:endParaRPr lang="en-US" dirty="0" smtClean="0"/>
+          </a:p>
+          <a:p>
+            <a:pPr marL="0" indent="0">
+              <a:buNone/>
+            </a:pPr>
+            <a:r>
+              <a:rPr lang="en-US" dirty="0" smtClean="0"/>
+              <a:t>All </a:t>
+            </a:r>
+            <a:r>
+              <a:rPr lang="en-US" dirty="0" smtClean="0"/>
+              <a:t>methods begin with a set of RNA-</a:t>
+            </a:r>
+            <a:r>
+              <a:rPr lang="en-US" dirty="0" err="1" smtClean="0"/>
+              <a:t>seq</a:t>
+            </a:r>
+            <a:r>
+              <a:rPr lang="en-US" dirty="0" smtClean="0"/>
+              <a:t> reads that have been mapped to the genome. An optional secondary input to </a:t>
+            </a:r>
+            <a:r>
+              <a:rPr lang="en-US" dirty="0" err="1" smtClean="0"/>
+              <a:t>StringTie</a:t>
+            </a:r>
+            <a:r>
+              <a:rPr lang="en-US" dirty="0" smtClean="0"/>
+              <a:t> is a set of pre-assembled super-reads, designated as </a:t>
+            </a:r>
+            <a:r>
+              <a:rPr lang="en-US" dirty="0" err="1" smtClean="0"/>
+              <a:t>StringTie+SR</a:t>
+            </a:r>
+            <a:r>
+              <a:rPr lang="en-US" dirty="0" smtClean="0"/>
+              <a:t>. </a:t>
+            </a:r>
+            <a:r>
+              <a:rPr lang="en-US" dirty="0" err="1" smtClean="0"/>
+              <a:t>StringTie</a:t>
+            </a:r>
+            <a:r>
+              <a:rPr lang="en-US" dirty="0" smtClean="0"/>
+              <a:t> first groups reads into clusters. Then it creates a splice</a:t>
+            </a:r>
+            <a:r>
+              <a:rPr lang="en-US" baseline="0" dirty="0" smtClean="0"/>
+              <a:t> graph for each cluster (nodes represent exons or parts of exons, and paths through the graph represent possible splice variants).</a:t>
+            </a:r>
+            <a:r>
+              <a:rPr lang="en-US" dirty="0" smtClean="0"/>
+              <a:t> </a:t>
+            </a:r>
+            <a:r>
+              <a:rPr lang="en-US" dirty="0" err="1" smtClean="0"/>
+              <a:t>StringTie</a:t>
+            </a:r>
+            <a:r>
+              <a:rPr lang="en-US" dirty="0" smtClean="0"/>
+              <a:t> </a:t>
+            </a:r>
+            <a:r>
+              <a:rPr lang="en-US" dirty="0" smtClean="0"/>
+              <a:t>iteratively extracts the heaviest path from </a:t>
+            </a:r>
+            <a:r>
+              <a:rPr lang="en-US" dirty="0" smtClean="0"/>
+              <a:t>the </a:t>
+            </a:r>
+            <a:r>
+              <a:rPr lang="en-US" dirty="0" smtClean="0"/>
+              <a:t>splice graph, constructs a flow network, computes maximum flow to estimate abundance, and then updates the splice graph by removing reads that were assigned by the flow algorithm. This process repeats until all reads have been assigned</a:t>
+            </a:r>
+            <a:r>
+              <a:rPr lang="en-US" dirty="0" smtClean="0"/>
+              <a:t>.</a:t>
+            </a:r>
+          </a:p>
+          <a:p>
+            <a:pPr marL="0" indent="0">
+              <a:buNone/>
+            </a:pPr>
+            <a:endParaRPr lang="en-US" dirty="0" smtClean="0"/>
+          </a:p>
+          <a:p>
+            <a:pPr marL="0" indent="0">
+              <a:buNone/>
+            </a:pPr>
             <a:r>
               <a:rPr lang="en-US" dirty="0" smtClean="0"/>
               <a:t>(</a:t>
-            </a:r>
-            <a:r>
-              <a:rPr lang="en-US" b="1" dirty="0" smtClean="0"/>
-              <a:t>a</a:t>
-            </a:r>
-            <a:r>
-              <a:rPr lang="en-US" dirty="0" smtClean="0"/>
-              <a:t>) Overview of the flow of the </a:t>
-            </a:r>
-            <a:r>
-              <a:rPr lang="en-US" dirty="0" err="1" smtClean="0"/>
-              <a:t>StringTie</a:t>
-            </a:r>
-            <a:r>
-              <a:rPr lang="en-US" dirty="0" smtClean="0"/>
-              <a:t> algorithm, compared to Cufflinks and </a:t>
-            </a:r>
-            <a:r>
-              <a:rPr lang="en-US" dirty="0" err="1" smtClean="0"/>
-              <a:t>Traph</a:t>
-            </a:r>
-            <a:r>
-              <a:rPr lang="en-US" dirty="0" smtClean="0"/>
-              <a:t>. All methods begin with a set of RNA-</a:t>
-            </a:r>
-            <a:r>
-              <a:rPr lang="en-US" dirty="0" err="1" smtClean="0"/>
-              <a:t>seq</a:t>
-            </a:r>
-            <a:r>
-              <a:rPr lang="en-US" dirty="0" smtClean="0"/>
-              <a:t> reads that have been mapped to the genome. An optional secondary input to </a:t>
-            </a:r>
-            <a:r>
-              <a:rPr lang="en-US" dirty="0" err="1" smtClean="0"/>
-              <a:t>StringTie</a:t>
-            </a:r>
-            <a:r>
-              <a:rPr lang="en-US" dirty="0" smtClean="0"/>
-              <a:t> is a set of pre-assembled super-reads, designated as </a:t>
-            </a:r>
-            <a:r>
-              <a:rPr lang="en-US" dirty="0" err="1" smtClean="0"/>
-              <a:t>StringTie+SR</a:t>
-            </a:r>
-            <a:r>
-              <a:rPr lang="en-US" dirty="0" smtClean="0"/>
-              <a:t>. </a:t>
-            </a:r>
-            <a:r>
-              <a:rPr lang="en-US" dirty="0" err="1" smtClean="0"/>
-              <a:t>StringTie</a:t>
-            </a:r>
-            <a:r>
-              <a:rPr lang="en-US" dirty="0" smtClean="0"/>
-              <a:t> iteratively extracts the heaviest path from a splice graph, constructs a flow network, computes maximum flow to estimate abundance, and then updates the splice graph by removing reads that were assigned by the flow algorithm. This process repeats until all reads have been assigned. (</a:t>
             </a:r>
             <a:r>
               <a:rPr lang="en-US" b="1" dirty="0" smtClean="0"/>
@@ -1413,6 +1482,423 @@
     <p:extLst>
       <p:ext uri="{BB962C8B-B14F-4D97-AF65-F5344CB8AC3E}">
         <p14:creationId xmlns:p14="http://schemas.microsoft.com/office/powerpoint/2010/main" val="1404458015"/>
+      </p:ext>
+    </p:extLst>
+  </p:cSld>
+  <p:clrMapOvr>
+    <a:masterClrMapping/>
+  </p:clrMapOvr>
+</p:notes>
+</file>
+
+<file path=ppt/notesSlides/notesSlide5.xml><?xml version="1.0" encoding="utf-8"?>
+<p:notes xmlns:a="http://schemas.openxmlformats.org/drawingml/2006/main" xmlns:r="http://schemas.openxmlformats.org/officeDocument/2006/relationships" xmlns:p="http://schemas.openxmlformats.org/presentationml/2006/main">
+  <p:cSld>
+    <p:spTree>
+      <p:nvGrpSpPr>
+        <p:cNvPr id="1" name=""/>
+        <p:cNvGrpSpPr/>
+        <p:nvPr/>
+      </p:nvGrpSpPr>
+      <p:grpSpPr>
+        <a:xfrm>
+          <a:off x="0" y="0"/>
+          <a:ext cx="0" cy="0"/>
+          <a:chOff x="0" y="0"/>
+          <a:chExt cx="0" cy="0"/>
+        </a:xfrm>
+      </p:grpSpPr>
+      <p:sp>
+        <p:nvSpPr>
+          <p:cNvPr id="2" name="Slide Image Placeholder 1"/>
+          <p:cNvSpPr>
+            <a:spLocks noGrp="1" noRot="1" noChangeAspect="1"/>
+          </p:cNvSpPr>
+          <p:nvPr>
+            <p:ph type="sldImg"/>
+          </p:nvPr>
+        </p:nvSpPr>
+        <p:spPr/>
+      </p:sp>
+      <p:sp>
+        <p:nvSpPr>
+          <p:cNvPr id="3" name="Notes Placeholder 2"/>
+          <p:cNvSpPr>
+            <a:spLocks noGrp="1"/>
+          </p:cNvSpPr>
+          <p:nvPr>
+            <p:ph type="body" idx="1"/>
+          </p:nvPr>
+        </p:nvSpPr>
+        <p:spPr/>
+        <p:txBody>
+          <a:bodyPr/>
+          <a:lstStyle/>
+          <a:p>
+            <a:r>
+              <a:rPr lang="en-US" sz="1200" b="0" i="0" u="none" strike="noStrike" kern="1200" baseline="0" dirty="0" smtClean="0">
+                <a:solidFill>
+                  <a:schemeClr val="tx1"/>
+                </a:solidFill>
+                <a:latin typeface="+mn-lt"/>
+                <a:ea typeface="ＭＳ Ｐゴシック" pitchFamily="-28" charset="-128"/>
+                <a:cs typeface="ＭＳ Ｐゴシック" pitchFamily="-28" charset="-128"/>
+              </a:rPr>
+              <a:t>The </a:t>
+            </a:r>
+            <a:r>
+              <a:rPr lang="en-US" sz="1200" b="0" i="0" u="none" strike="noStrike" kern="1200" baseline="0" dirty="0" err="1" smtClean="0">
+                <a:solidFill>
+                  <a:schemeClr val="tx1"/>
+                </a:solidFill>
+                <a:latin typeface="+mn-lt"/>
+                <a:ea typeface="ＭＳ Ｐゴシック" pitchFamily="-28" charset="-128"/>
+                <a:cs typeface="ＭＳ Ｐゴシック" pitchFamily="-28" charset="-128"/>
+              </a:rPr>
+              <a:t>StringTie</a:t>
+            </a:r>
+            <a:r>
+              <a:rPr lang="en-US" sz="1200" b="0" i="0" u="none" strike="noStrike" kern="1200" baseline="0" dirty="0" smtClean="0">
+                <a:solidFill>
+                  <a:schemeClr val="tx1"/>
+                </a:solidFill>
+                <a:latin typeface="+mn-lt"/>
+                <a:ea typeface="ＭＳ Ｐゴシック" pitchFamily="-28" charset="-128"/>
+                <a:cs typeface="ＭＳ Ｐゴシック" pitchFamily="-28" charset="-128"/>
+              </a:rPr>
+              <a:t> algorithm: RNA-</a:t>
+            </a:r>
+            <a:r>
+              <a:rPr lang="en-US" sz="1200" b="0" i="0" u="none" strike="noStrike" kern="1200" baseline="0" dirty="0" err="1" smtClean="0">
+                <a:solidFill>
+                  <a:schemeClr val="tx1"/>
+                </a:solidFill>
+                <a:latin typeface="+mn-lt"/>
+                <a:ea typeface="ＭＳ Ｐゴシック" pitchFamily="-28" charset="-128"/>
+                <a:cs typeface="ＭＳ Ｐゴシック" pitchFamily="-28" charset="-128"/>
+              </a:rPr>
+              <a:t>seq</a:t>
+            </a:r>
+            <a:r>
+              <a:rPr lang="en-US" sz="1200" b="0" i="0" u="none" strike="noStrike" kern="1200" baseline="0" dirty="0" smtClean="0">
+                <a:solidFill>
+                  <a:schemeClr val="tx1"/>
+                </a:solidFill>
+                <a:latin typeface="+mn-lt"/>
+                <a:ea typeface="ＭＳ Ｐゴシック" pitchFamily="-28" charset="-128"/>
+                <a:cs typeface="ＭＳ Ｐゴシック" pitchFamily="-28" charset="-128"/>
+              </a:rPr>
+              <a:t> reads are assembled into super-reads (Step 1) and then super-reads plus un-assembled reads are mapped to the genome (Step 2). In Step 3, mapped reads and super-reads are used to build an alternative splice graph. We use the path from source (s) to sink (t) with the heaviest coverage to build a flow network corresponding to the transcript represented by that path (Step 4). The maximum flow in this network represents the coverage of one assembled transcript, which is removed from the splice graph (Step 5). Steps 4 and 5 are repeated until no more transcripts can be assembled. </a:t>
+            </a:r>
+            <a:endParaRPr lang="en-US" dirty="0"/>
+          </a:p>
+        </p:txBody>
+      </p:sp>
+      <p:sp>
+        <p:nvSpPr>
+          <p:cNvPr id="4" name="Slide Number Placeholder 3"/>
+          <p:cNvSpPr>
+            <a:spLocks noGrp="1"/>
+          </p:cNvSpPr>
+          <p:nvPr>
+            <p:ph type="sldNum" sz="quarter" idx="10"/>
+          </p:nvPr>
+        </p:nvSpPr>
+        <p:spPr/>
+        <p:txBody>
+          <a:bodyPr/>
+          <a:lstStyle/>
+          <a:p>
+            <a:pPr>
+              <a:defRPr/>
+            </a:pPr>
+            <a:fld id="{F3969550-FBCF-404B-9FAA-7B1DCDF2C4FF}" type="slidenum">
+              <a:rPr lang="en-US" smtClean="0"/>
+              <a:pPr>
+                <a:defRPr/>
+              </a:pPr>
+              <a:t>10</a:t>
+            </a:fld>
+            <a:endParaRPr lang="en-US"/>
+          </a:p>
+        </p:txBody>
+      </p:sp>
+    </p:spTree>
+    <p:extLst>
+      <p:ext uri="{BB962C8B-B14F-4D97-AF65-F5344CB8AC3E}">
+        <p14:creationId xmlns:p14="http://schemas.microsoft.com/office/powerpoint/2010/main" val="1924967417"/>
+      </p:ext>
+    </p:extLst>
+  </p:cSld>
+  <p:clrMapOvr>
+    <a:masterClrMapping/>
+  </p:clrMapOvr>
+</p:notes>
+</file>
+
+<file path=ppt/notesSlides/notesSlide6.xml><?xml version="1.0" encoding="utf-8"?>
+<p:notes xmlns:a="http://schemas.openxmlformats.org/drawingml/2006/main" xmlns:r="http://schemas.openxmlformats.org/officeDocument/2006/relationships" xmlns:p="http://schemas.openxmlformats.org/presentationml/2006/main">
+  <p:cSld>
+    <p:spTree>
+      <p:nvGrpSpPr>
+        <p:cNvPr id="1" name=""/>
+        <p:cNvGrpSpPr/>
+        <p:nvPr/>
+      </p:nvGrpSpPr>
+      <p:grpSpPr>
+        <a:xfrm>
+          <a:off x="0" y="0"/>
+          <a:ext cx="0" cy="0"/>
+          <a:chOff x="0" y="0"/>
+          <a:chExt cx="0" cy="0"/>
+        </a:xfrm>
+      </p:grpSpPr>
+      <p:sp>
+        <p:nvSpPr>
+          <p:cNvPr id="2" name="Slide Image Placeholder 1"/>
+          <p:cNvSpPr>
+            <a:spLocks noGrp="1" noRot="1" noChangeAspect="1"/>
+          </p:cNvSpPr>
+          <p:nvPr>
+            <p:ph type="sldImg"/>
+          </p:nvPr>
+        </p:nvSpPr>
+        <p:spPr/>
+      </p:sp>
+      <p:sp>
+        <p:nvSpPr>
+          <p:cNvPr id="3" name="Notes Placeholder 2"/>
+          <p:cNvSpPr>
+            <a:spLocks noGrp="1"/>
+          </p:cNvSpPr>
+          <p:nvPr>
+            <p:ph type="body" idx="1"/>
+          </p:nvPr>
+        </p:nvSpPr>
+        <p:spPr/>
+        <p:txBody>
+          <a:bodyPr/>
+          <a:lstStyle/>
+          <a:p>
+            <a:r>
+              <a:rPr lang="en-US" sz="1200" b="0" i="0" u="none" strike="noStrike" kern="1200" baseline="0" dirty="0" smtClean="0">
+                <a:solidFill>
+                  <a:schemeClr val="tx1"/>
+                </a:solidFill>
+                <a:latin typeface="+mn-lt"/>
+                <a:ea typeface="ＭＳ Ｐゴシック" pitchFamily="-28" charset="-128"/>
+                <a:cs typeface="ＭＳ Ｐゴシック" pitchFamily="-28" charset="-128"/>
+              </a:rPr>
+              <a:t>Flow network associated with a transcript (shown with colored nodes). 15 fragments (shown in grey) align to the transcript. Two nodes in the flow network are connected if a fragment starts and ends at those nodes. E.g., nodes 1 and 5 are connected because fragment (a) starts at node 1 and ends at node 5. For each colored node in the transcript, two nodes are created in the flow network. Capacities on edges (not connecting source or sink) are shown in red. </a:t>
+            </a:r>
+          </a:p>
+          <a:p>
+            <a:endParaRPr lang="en-US" sz="1200" b="0" i="0" u="none" strike="noStrike" kern="1200" baseline="0" dirty="0" smtClean="0">
+              <a:solidFill>
+                <a:schemeClr val="tx1"/>
+              </a:solidFill>
+              <a:latin typeface="+mn-lt"/>
+              <a:ea typeface="ＭＳ Ｐゴシック" pitchFamily="-28" charset="-128"/>
+              <a:cs typeface="ＭＳ Ｐゴシック" pitchFamily="-28" charset="-128"/>
+            </a:endParaRPr>
+          </a:p>
+          <a:p>
+            <a:r>
+              <a:rPr lang="en-US" sz="1200" b="0" i="0" u="none" strike="noStrike" kern="1200" baseline="0" dirty="0" smtClean="0">
+                <a:solidFill>
+                  <a:schemeClr val="tx1"/>
+                </a:solidFill>
+                <a:latin typeface="+mn-lt"/>
+                <a:ea typeface="ＭＳ Ｐゴシック" pitchFamily="-28" charset="-128"/>
+                <a:cs typeface="ＭＳ Ｐゴシック" pitchFamily="-28" charset="-128"/>
+              </a:rPr>
+              <a:t>In the first node (corresponding to exon1) there are 7 fragments. One of these fragments is connected to exon5 (starts at beginning of exon1 and ends at end of exon5), while 6 fragments are connected to exon3. In the second node (corresponding to exon3) there are 13 fragments, of which 3 are connected to exon 5. The final node (corresponding to exon5) has 4 supporting fragments. The maximum flow is clearly 1 – 3 – 5. </a:t>
+            </a:r>
+          </a:p>
+          <a:p>
+            <a:endParaRPr lang="en-US" sz="1200" b="0" i="0" u="none" strike="noStrike" kern="1200" baseline="0" dirty="0" smtClean="0">
+              <a:solidFill>
+                <a:schemeClr val="tx1"/>
+              </a:solidFill>
+              <a:latin typeface="+mn-lt"/>
+              <a:ea typeface="ＭＳ Ｐゴシック" pitchFamily="-28" charset="-128"/>
+              <a:cs typeface="ＭＳ Ｐゴシック" pitchFamily="-28" charset="-128"/>
+            </a:endParaRPr>
+          </a:p>
+          <a:p>
+            <a:r>
+              <a:rPr lang="en-US" sz="1200" b="0" i="0" u="none" strike="noStrike" kern="1200" baseline="0" dirty="0" err="1" smtClean="0">
+                <a:solidFill>
+                  <a:schemeClr val="tx1"/>
+                </a:solidFill>
+                <a:latin typeface="+mn-lt"/>
+                <a:ea typeface="ＭＳ Ｐゴシック" pitchFamily="-28" charset="-128"/>
+                <a:cs typeface="ＭＳ Ｐゴシック" pitchFamily="-28" charset="-128"/>
+              </a:rPr>
+              <a:t>StringTie</a:t>
+            </a:r>
+            <a:r>
+              <a:rPr lang="en-US" sz="1200" b="0" i="0" u="none" strike="noStrike" kern="1200" baseline="0" dirty="0" smtClean="0">
+                <a:solidFill>
+                  <a:schemeClr val="tx1"/>
+                </a:solidFill>
+                <a:latin typeface="+mn-lt"/>
+                <a:ea typeface="ＭＳ Ｐゴシック" pitchFamily="-28" charset="-128"/>
+                <a:cs typeface="ＭＳ Ｐゴシック" pitchFamily="-28" charset="-128"/>
+              </a:rPr>
+              <a:t> estimates the coverage level of the transcript by solving a maximum-flow problem that determines the maximum number of fragments that can be associated with the chosen transcript. </a:t>
+            </a:r>
+          </a:p>
+          <a:p>
+            <a:endParaRPr lang="en-US" sz="1200" b="0" i="0" u="none" strike="noStrike" kern="1200" baseline="0" dirty="0" smtClean="0">
+              <a:solidFill>
+                <a:schemeClr val="tx1"/>
+              </a:solidFill>
+              <a:latin typeface="+mn-lt"/>
+              <a:ea typeface="ＭＳ Ｐゴシック" pitchFamily="-28" charset="-128"/>
+              <a:cs typeface="ＭＳ Ｐゴシック" pitchFamily="-28" charset="-128"/>
+            </a:endParaRPr>
+          </a:p>
+          <a:p>
+            <a:r>
+              <a:rPr lang="en-US" dirty="0" smtClean="0"/>
+              <a:t>The maximum flow problem is a well-studied problem in optimization theory.</a:t>
+            </a:r>
+            <a:endParaRPr lang="en-US" dirty="0"/>
+          </a:p>
+        </p:txBody>
+      </p:sp>
+      <p:sp>
+        <p:nvSpPr>
+          <p:cNvPr id="4" name="Slide Number Placeholder 3"/>
+          <p:cNvSpPr>
+            <a:spLocks noGrp="1"/>
+          </p:cNvSpPr>
+          <p:nvPr>
+            <p:ph type="sldNum" sz="quarter" idx="10"/>
+          </p:nvPr>
+        </p:nvSpPr>
+        <p:spPr/>
+        <p:txBody>
+          <a:bodyPr/>
+          <a:lstStyle/>
+          <a:p>
+            <a:pPr>
+              <a:defRPr/>
+            </a:pPr>
+            <a:fld id="{F3969550-FBCF-404B-9FAA-7B1DCDF2C4FF}" type="slidenum">
+              <a:rPr lang="en-US" smtClean="0"/>
+              <a:pPr>
+                <a:defRPr/>
+              </a:pPr>
+              <a:t>11</a:t>
+            </a:fld>
+            <a:endParaRPr lang="en-US"/>
+          </a:p>
+        </p:txBody>
+      </p:sp>
+    </p:spTree>
+    <p:extLst>
+      <p:ext uri="{BB962C8B-B14F-4D97-AF65-F5344CB8AC3E}">
+        <p14:creationId xmlns:p14="http://schemas.microsoft.com/office/powerpoint/2010/main" val="3791755361"/>
+      </p:ext>
+    </p:extLst>
+  </p:cSld>
+  <p:clrMapOvr>
+    <a:masterClrMapping/>
+  </p:clrMapOvr>
+</p:notes>
+</file>
+
+<file path=ppt/notesSlides/notesSlide7.xml><?xml version="1.0" encoding="utf-8"?>
+<p:notes xmlns:a="http://schemas.openxmlformats.org/drawingml/2006/main" xmlns:r="http://schemas.openxmlformats.org/officeDocument/2006/relationships" xmlns:p="http://schemas.openxmlformats.org/presentationml/2006/main">
+  <p:cSld>
+    <p:spTree>
+      <p:nvGrpSpPr>
+        <p:cNvPr id="1" name=""/>
+        <p:cNvGrpSpPr/>
+        <p:nvPr/>
+      </p:nvGrpSpPr>
+      <p:grpSpPr>
+        <a:xfrm>
+          <a:off x="0" y="0"/>
+          <a:ext cx="0" cy="0"/>
+          <a:chOff x="0" y="0"/>
+          <a:chExt cx="0" cy="0"/>
+        </a:xfrm>
+      </p:grpSpPr>
+      <p:sp>
+        <p:nvSpPr>
+          <p:cNvPr id="2" name="Slide Image Placeholder 1"/>
+          <p:cNvSpPr>
+            <a:spLocks noGrp="1" noRot="1" noChangeAspect="1"/>
+          </p:cNvSpPr>
+          <p:nvPr>
+            <p:ph type="sldImg"/>
+          </p:nvPr>
+        </p:nvSpPr>
+        <p:spPr/>
+      </p:sp>
+      <p:sp>
+        <p:nvSpPr>
+          <p:cNvPr id="3" name="Notes Placeholder 2"/>
+          <p:cNvSpPr>
+            <a:spLocks noGrp="1"/>
+          </p:cNvSpPr>
+          <p:nvPr>
+            <p:ph type="body" idx="1"/>
+          </p:nvPr>
+        </p:nvSpPr>
+        <p:spPr/>
+        <p:txBody>
+          <a:bodyPr/>
+          <a:lstStyle/>
+          <a:p>
+            <a:r>
+              <a:rPr lang="en-US" dirty="0" smtClean="0"/>
+              <a:t>We recommend </a:t>
+            </a:r>
+            <a:r>
+              <a:rPr lang="en-US" dirty="0" err="1" smtClean="0"/>
+              <a:t>intersection_strict</a:t>
+            </a:r>
+            <a:endParaRPr lang="en-US" dirty="0"/>
+          </a:p>
+        </p:txBody>
+      </p:sp>
+      <p:sp>
+        <p:nvSpPr>
+          <p:cNvPr id="4" name="Slide Number Placeholder 3"/>
+          <p:cNvSpPr>
+            <a:spLocks noGrp="1"/>
+          </p:cNvSpPr>
+          <p:nvPr>
+            <p:ph type="sldNum" sz="quarter" idx="10"/>
+          </p:nvPr>
+        </p:nvSpPr>
+        <p:spPr/>
+        <p:txBody>
+          <a:bodyPr/>
+          <a:lstStyle/>
+          <a:p>
+            <a:pPr>
+              <a:defRPr/>
+            </a:pPr>
+            <a:fld id="{F3969550-FBCF-404B-9FAA-7B1DCDF2C4FF}" type="slidenum">
+              <a:rPr lang="en-US" smtClean="0"/>
+              <a:pPr>
+                <a:defRPr/>
+              </a:pPr>
+              <a:t>17</a:t>
+            </a:fld>
+            <a:endParaRPr lang="en-US"/>
+          </a:p>
+        </p:txBody>
+      </p:sp>
+    </p:spTree>
+    <p:extLst>
+      <p:ext uri="{BB962C8B-B14F-4D97-AF65-F5344CB8AC3E}">
+        <p14:creationId xmlns:p14="http://schemas.microsoft.com/office/powerpoint/2010/main" val="3827937735"/>
       </p:ext>
     </p:extLst>
   </p:cSld>
@@ -3869,7 +4355,7 @@
               <a:pPr>
                 <a:defRPr/>
               </a:pPr>
-              <a:t>7/10/17</a:t>
+              <a:t>7/11/17</a:t>
             </a:fld>
             <a:endParaRPr lang="en-US"/>
           </a:p>
@@ -4501,6 +4987,316 @@
           <a:chExt cx="0" cy="0"/>
         </a:xfrm>
       </p:grpSpPr>
+      <p:pic>
+        <p:nvPicPr>
+          <p:cNvPr id="4" name="Content Placeholder 3" descr="nbt.3122-S1_Page_13.png"/>
+          <p:cNvPicPr>
+            <a:picLocks noGrp="1" noChangeAspect="1"/>
+          </p:cNvPicPr>
+          <p:nvPr>
+            <p:ph idx="1"/>
+          </p:nvPr>
+        </p:nvPicPr>
+        <p:blipFill rotWithShape="1">
+          <a:blip r:embed="rId3" cstate="print">
+            <a:extLst>
+              <a:ext uri="{28A0092B-C50C-407E-A947-70E740481C1C}">
+                <a14:useLocalDpi xmlns:a14="http://schemas.microsoft.com/office/drawing/2010/main" val="0"/>
+              </a:ext>
+            </a:extLst>
+          </a:blip>
+          <a:srcRect l="12267" t="9572" r="12178" b="46442"/>
+          <a:stretch/>
+        </p:blipFill>
+        <p:spPr>
+          <a:xfrm>
+            <a:off x="899593" y="667233"/>
+            <a:ext cx="7488831" cy="5642087"/>
+          </a:xfrm>
+        </p:spPr>
+      </p:pic>
+      <p:sp>
+        <p:nvSpPr>
+          <p:cNvPr id="5" name="Title 1"/>
+          <p:cNvSpPr>
+            <a:spLocks noGrp="1"/>
+          </p:cNvSpPr>
+          <p:nvPr>
+            <p:ph type="title"/>
+          </p:nvPr>
+        </p:nvSpPr>
+        <p:spPr>
+          <a:xfrm>
+            <a:off x="152400" y="44624"/>
+            <a:ext cx="8839200" cy="490066"/>
+          </a:xfrm>
+        </p:spPr>
+        <p:txBody>
+          <a:bodyPr/>
+          <a:lstStyle/>
+          <a:p>
+            <a:r>
+              <a:rPr lang="en-US" sz="2000" dirty="0" smtClean="0"/>
+              <a:t>Construct splice graph, identify path with heaviest coverage, construct flow network, assemble transcript, remove reads and repeat</a:t>
+            </a:r>
+            <a:endParaRPr lang="en-US" sz="2000" dirty="0"/>
+          </a:p>
+        </p:txBody>
+      </p:sp>
+    </p:spTree>
+    <p:extLst>
+      <p:ext uri="{BB962C8B-B14F-4D97-AF65-F5344CB8AC3E}">
+        <p14:creationId xmlns:p14="http://schemas.microsoft.com/office/powerpoint/2010/main" val="311265528"/>
+      </p:ext>
+    </p:extLst>
+  </p:cSld>
+  <p:clrMapOvr>
+    <a:masterClrMapping/>
+  </p:clrMapOvr>
+  <p:timing>
+    <p:tnLst>
+      <p:par>
+        <p:cTn xmlns:p14="http://schemas.microsoft.com/office/powerpoint/2010/main" id="1" dur="indefinite" restart="never" nodeType="tmRoot"/>
+      </p:par>
+    </p:tnLst>
+  </p:timing>
+</p:sld>
+</file>
+
+<file path=ppt/slides/slide11.xml><?xml version="1.0" encoding="utf-8"?>
+<p:sld xmlns:a="http://schemas.openxmlformats.org/drawingml/2006/main" xmlns:r="http://schemas.openxmlformats.org/officeDocument/2006/relationships" xmlns:p="http://schemas.openxmlformats.org/presentationml/2006/main">
+  <p:cSld>
+    <p:spTree>
+      <p:nvGrpSpPr>
+        <p:cNvPr id="1" name=""/>
+        <p:cNvGrpSpPr/>
+        <p:nvPr/>
+      </p:nvGrpSpPr>
+      <p:grpSpPr>
+        <a:xfrm>
+          <a:off x="0" y="0"/>
+          <a:ext cx="0" cy="0"/>
+          <a:chOff x="0" y="0"/>
+          <a:chExt cx="0" cy="0"/>
+        </a:xfrm>
+      </p:grpSpPr>
+      <p:sp>
+        <p:nvSpPr>
+          <p:cNvPr id="2" name="Title 1"/>
+          <p:cNvSpPr>
+            <a:spLocks noGrp="1"/>
+          </p:cNvSpPr>
+          <p:nvPr>
+            <p:ph type="title"/>
+          </p:nvPr>
+        </p:nvSpPr>
+        <p:spPr>
+          <a:xfrm>
+            <a:off x="152400" y="44624"/>
+            <a:ext cx="8839200" cy="1008112"/>
+          </a:xfrm>
+        </p:spPr>
+        <p:txBody>
+          <a:bodyPr/>
+          <a:lstStyle/>
+          <a:p>
+            <a:r>
+              <a:rPr lang="en-US" sz="2800" dirty="0" smtClean="0"/>
+              <a:t>From flow network for each transcript, maximum flow is used to assemble transcript and estimate abundance </a:t>
+            </a:r>
+            <a:endParaRPr lang="en-US" sz="2800" dirty="0"/>
+          </a:p>
+        </p:txBody>
+      </p:sp>
+      <p:pic>
+        <p:nvPicPr>
+          <p:cNvPr id="4" name="Content Placeholder 3" descr="nbt.3122-S1_Page_14.png"/>
+          <p:cNvPicPr>
+            <a:picLocks noGrp="1" noChangeAspect="1"/>
+          </p:cNvPicPr>
+          <p:nvPr>
+            <p:ph idx="1"/>
+          </p:nvPr>
+        </p:nvPicPr>
+        <p:blipFill rotWithShape="1">
+          <a:blip r:embed="rId3" cstate="print">
+            <a:extLst>
+              <a:ext uri="{28A0092B-C50C-407E-A947-70E740481C1C}">
+                <a14:useLocalDpi xmlns:a14="http://schemas.microsoft.com/office/drawing/2010/main" val="0"/>
+              </a:ext>
+            </a:extLst>
+          </a:blip>
+          <a:srcRect l="17889" t="11473" r="30804" b="58388"/>
+          <a:stretch/>
+        </p:blipFill>
+        <p:spPr>
+          <a:xfrm>
+            <a:off x="1115616" y="980728"/>
+            <a:ext cx="6480720" cy="4926544"/>
+          </a:xfrm>
+        </p:spPr>
+      </p:pic>
+      <p:sp>
+        <p:nvSpPr>
+          <p:cNvPr id="5" name="Rectangle 4"/>
+          <p:cNvSpPr/>
+          <p:nvPr/>
+        </p:nvSpPr>
+        <p:spPr>
+          <a:xfrm>
+            <a:off x="179512" y="5877272"/>
+            <a:ext cx="8964488" cy="523220"/>
+          </a:xfrm>
+          <a:prstGeom prst="rect">
+            <a:avLst/>
+          </a:prstGeom>
+        </p:spPr>
+        <p:txBody>
+          <a:bodyPr wrap="square">
+            <a:spAutoFit/>
+          </a:bodyPr>
+          <a:lstStyle/>
+          <a:p>
+            <a:r>
+              <a:rPr lang="en-US" sz="1400" dirty="0" err="1" smtClean="0"/>
+              <a:t>StringTie</a:t>
+            </a:r>
+            <a:r>
+              <a:rPr lang="en-US" sz="1400" dirty="0"/>
+              <a:t> </a:t>
+            </a:r>
+            <a:r>
+              <a:rPr lang="en-US" sz="1400" dirty="0" smtClean="0"/>
+              <a:t>uses basic graph theory (splice graph), custom heuristics (heaviest path), more graph theory (flow network) and optimization theory (maximum flow). See </a:t>
+            </a:r>
+            <a:r>
+              <a:rPr lang="en-US" sz="1400" dirty="0" err="1" smtClean="0"/>
+              <a:t>StringTie</a:t>
+            </a:r>
+            <a:r>
+              <a:rPr lang="en-US" sz="1400" dirty="0" smtClean="0"/>
+              <a:t> paper for </a:t>
+            </a:r>
+            <a:r>
+              <a:rPr lang="en-US" sz="1400" dirty="0" err="1" smtClean="0"/>
+              <a:t>defintions</a:t>
+            </a:r>
+            <a:r>
+              <a:rPr lang="en-US" sz="1400" dirty="0" smtClean="0"/>
+              <a:t> and math.</a:t>
+            </a:r>
+            <a:endParaRPr lang="en-US" sz="1400" dirty="0"/>
+          </a:p>
+        </p:txBody>
+      </p:sp>
+    </p:spTree>
+    <p:extLst>
+      <p:ext uri="{BB962C8B-B14F-4D97-AF65-F5344CB8AC3E}">
+        <p14:creationId xmlns:p14="http://schemas.microsoft.com/office/powerpoint/2010/main" val="1173353639"/>
+      </p:ext>
+    </p:extLst>
+  </p:cSld>
+  <p:clrMapOvr>
+    <a:masterClrMapping/>
+  </p:clrMapOvr>
+  <p:timing>
+    <p:tnLst>
+      <p:par>
+        <p:cTn xmlns:p14="http://schemas.microsoft.com/office/powerpoint/2010/main" id="1" dur="indefinite" restart="never" nodeType="tmRoot">
+          <p:childTnLst>
+            <p:seq concurrent="1" nextAc="seek">
+              <p:cTn id="2" dur="indefinite" nodeType="mainSeq">
+                <p:childTnLst>
+                  <p:par>
+                    <p:cTn id="3" fill="hold">
+                      <p:stCondLst>
+                        <p:cond delay="indefinite"/>
+                      </p:stCondLst>
+                      <p:childTnLst>
+                        <p:par>
+                          <p:cTn id="4" fill="hold">
+                            <p:stCondLst>
+                              <p:cond delay="0"/>
+                            </p:stCondLst>
+                            <p:childTnLst>
+                              <p:par>
+                                <p:cTn id="5" presetID="1" presetClass="entr" presetSubtype="0" fill="hold" grpId="0" nodeType="clickEffect">
+                                  <p:stCondLst>
+                                    <p:cond delay="0"/>
+                                  </p:stCondLst>
+                                  <p:childTnLst>
+                                    <p:set>
+                                      <p:cBhvr>
+                                        <p:cTn id="6" dur="1" fill="hold">
+                                          <p:stCondLst>
+                                            <p:cond delay="0"/>
+                                          </p:stCondLst>
+                                        </p:cTn>
+                                        <p:tgtEl>
+                                          <p:spTgt spid="5"/>
+                                        </p:tgtEl>
+                                        <p:attrNameLst>
+                                          <p:attrName>style.visibility</p:attrName>
+                                        </p:attrNameLst>
+                                      </p:cBhvr>
+                                      <p:to>
+                                        <p:strVal val="visible"/>
+                                      </p:to>
+                                    </p:set>
+                                  </p:childTnLst>
+                                </p:cTn>
+                              </p:par>
+                            </p:childTnLst>
+                          </p:cTn>
+                        </p:par>
+                      </p:childTnLst>
+                    </p:cTn>
+                  </p:par>
+                </p:childTnLst>
+              </p:cTn>
+              <p:prevCondLst>
+                <p:cond evt="onPrev" delay="0">
+                  <p:tgtEl>
+                    <p:sldTgt/>
+                  </p:tgtEl>
+                </p:cond>
+              </p:prevCondLst>
+              <p:nextCondLst>
+                <p:cond evt="onNext" delay="0">
+                  <p:tgtEl>
+                    <p:sldTgt/>
+                  </p:tgtEl>
+                </p:cond>
+              </p:nextCondLst>
+            </p:seq>
+          </p:childTnLst>
+        </p:cTn>
+      </p:par>
+    </p:tnLst>
+    <p:bldLst>
+      <p:bldP spid="5" grpId="0"/>
+    </p:bldLst>
+  </p:timing>
+</p:sld>
+</file>
+
+<file path=ppt/slides/slide12.xml><?xml version="1.0" encoding="utf-8"?>
+<p:sld xmlns:a="http://schemas.openxmlformats.org/drawingml/2006/main" xmlns:r="http://schemas.openxmlformats.org/officeDocument/2006/relationships" xmlns:p="http://schemas.openxmlformats.org/presentationml/2006/main">
+  <p:cSld>
+    <p:spTree>
+      <p:nvGrpSpPr>
+        <p:cNvPr id="1" name=""/>
+        <p:cNvGrpSpPr/>
+        <p:nvPr/>
+      </p:nvGrpSpPr>
+      <p:grpSpPr>
+        <a:xfrm>
+          <a:off x="0" y="0"/>
+          <a:ext cx="0" cy="0"/>
+          <a:chOff x="0" y="0"/>
+          <a:chExt cx="0" cy="0"/>
+        </a:xfrm>
+      </p:grpSpPr>
       <p:sp>
         <p:nvSpPr>
           <p:cNvPr id="2" name="Title 1"/>
@@ -4630,10 +5426,17 @@
   <p:clrMapOvr>
     <a:masterClrMapping/>
   </p:clrMapOvr>
+  <p:timing>
+    <p:tnLst>
+      <p:par>
+        <p:cTn xmlns:p14="http://schemas.microsoft.com/office/powerpoint/2010/main" id="1" dur="indefinite" restart="never" nodeType="tmRoot"/>
+      </p:par>
+    </p:tnLst>
+  </p:timing>
 </p:sld>
 </file>
 
-<file path=ppt/slides/slide11.xml><?xml version="1.0" encoding="utf-8"?>
+<file path=ppt/slides/slide13.xml><?xml version="1.0" encoding="utf-8"?>
 <p:sld xmlns:a="http://schemas.openxmlformats.org/drawingml/2006/main" xmlns:r="http://schemas.openxmlformats.org/officeDocument/2006/relationships" xmlns:p="http://schemas.openxmlformats.org/presentationml/2006/main">
   <p:cSld>
     <p:spTree>
@@ -4789,10 +5592,17 @@
   <p:clrMapOvr>
     <a:masterClrMapping/>
   </p:clrMapOvr>
+  <p:timing>
+    <p:tnLst>
+      <p:par>
+        <p:cTn xmlns:p14="http://schemas.microsoft.com/office/powerpoint/2010/main" id="1" dur="indefinite" restart="never" nodeType="tmRoot"/>
+      </p:par>
+    </p:tnLst>
+  </p:timing>
 </p:sld>
 </file>
 
-<file path=ppt/slides/slide12.xml><?xml version="1.0" encoding="utf-8"?>
+<file path=ppt/slides/slide14.xml><?xml version="1.0" encoding="utf-8"?>
 <p:sld xmlns:a="http://schemas.openxmlformats.org/drawingml/2006/main" xmlns:r="http://schemas.openxmlformats.org/officeDocument/2006/relationships" xmlns:p="http://schemas.openxmlformats.org/presentationml/2006/main">
   <p:cSld>
     <p:spTree>
@@ -5008,10 +5818,17 @@
   <p:clrMapOvr>
     <a:masterClrMapping/>
   </p:clrMapOvr>
+  <p:timing>
+    <p:tnLst>
+      <p:par>
+        <p:cTn xmlns:p14="http://schemas.microsoft.com/office/powerpoint/2010/main" id="1" dur="indefinite" restart="never" nodeType="tmRoot"/>
+      </p:par>
+    </p:tnLst>
+  </p:timing>
 </p:sld>
 </file>
 
-<file path=ppt/slides/slide13.xml><?xml version="1.0" encoding="utf-8"?>
+<file path=ppt/slides/slide15.xml><?xml version="1.0" encoding="utf-8"?>
 <p:sld xmlns:a="http://schemas.openxmlformats.org/drawingml/2006/main" xmlns:r="http://schemas.openxmlformats.org/officeDocument/2006/relationships" xmlns:p="http://schemas.openxmlformats.org/presentationml/2006/main">
   <p:cSld>
     <p:spTree>
@@ -5190,10 +6007,17 @@
   <p:clrMapOvr>
     <a:masterClrMapping/>
   </p:clrMapOvr>
+  <p:timing>
+    <p:tnLst>
+      <p:par>
+        <p:cTn xmlns:p14="http://schemas.microsoft.com/office/powerpoint/2010/main" id="1" dur="indefinite" restart="never" nodeType="tmRoot"/>
+      </p:par>
+    </p:tnLst>
+  </p:timing>
 </p:sld>
 </file>
 
-<file path=ppt/slides/slide14.xml><?xml version="1.0" encoding="utf-8"?>
+<file path=ppt/slides/slide16.xml><?xml version="1.0" encoding="utf-8"?>
 <p:sld xmlns:a="http://schemas.openxmlformats.org/drawingml/2006/main" xmlns:r="http://schemas.openxmlformats.org/officeDocument/2006/relationships" xmlns:p="http://schemas.openxmlformats.org/presentationml/2006/main">
   <p:cSld>
     <p:spTree>
@@ -5506,401 +6330,6 @@
     <p:extLst>
       <p:ext uri="{BB962C8B-B14F-4D97-AF65-F5344CB8AC3E}">
         <p14:creationId xmlns:p14="http://schemas.microsoft.com/office/powerpoint/2010/main" val="3790579955"/>
-      </p:ext>
-    </p:extLst>
-  </p:cSld>
-  <p:clrMapOvr>
-    <a:masterClrMapping/>
-  </p:clrMapOvr>
-  <p:timing>
-    <p:tnLst>
-      <p:par>
-        <p:cTn xmlns:p14="http://schemas.microsoft.com/office/powerpoint/2010/main" id="1" dur="indefinite" restart="never" nodeType="tmRoot"/>
-      </p:par>
-    </p:tnLst>
-  </p:timing>
-</p:sld>
-</file>
-
-<file path=ppt/slides/slide15.xml><?xml version="1.0" encoding="utf-8"?>
-<p:sld xmlns:a="http://schemas.openxmlformats.org/drawingml/2006/main" xmlns:r="http://schemas.openxmlformats.org/officeDocument/2006/relationships" xmlns:p="http://schemas.openxmlformats.org/presentationml/2006/main">
-  <p:cSld>
-    <p:spTree>
-      <p:nvGrpSpPr>
-        <p:cNvPr id="1" name=""/>
-        <p:cNvGrpSpPr/>
-        <p:nvPr/>
-      </p:nvGrpSpPr>
-      <p:grpSpPr>
-        <a:xfrm>
-          <a:off x="0" y="0"/>
-          <a:ext cx="0" cy="0"/>
-          <a:chOff x="0" y="0"/>
-          <a:chExt cx="0" cy="0"/>
-        </a:xfrm>
-      </p:grpSpPr>
-      <p:sp>
-        <p:nvSpPr>
-          <p:cNvPr id="31745" name="Title 1"/>
-          <p:cNvSpPr>
-            <a:spLocks noGrp="1"/>
-          </p:cNvSpPr>
-          <p:nvPr>
-            <p:ph type="title"/>
-          </p:nvPr>
-        </p:nvSpPr>
-        <p:spPr>
-          <a:xfrm>
-            <a:off x="152400" y="-27384"/>
-            <a:ext cx="8839200" cy="1143000"/>
-          </a:xfrm>
-        </p:spPr>
-        <p:txBody>
-          <a:bodyPr/>
-          <a:lstStyle/>
-          <a:p>
-            <a:r>
-              <a:rPr lang="en-US" dirty="0">
-                <a:latin typeface="Calibri" charset="0"/>
-                <a:ea typeface="ＭＳ Ｐゴシック" charset="0"/>
-              </a:rPr>
-              <a:t>‘FPKM’ expression estimates vs. ‘raw’ counts</a:t>
-            </a:r>
-          </a:p>
-        </p:txBody>
-      </p:sp>
-      <p:sp>
-        <p:nvSpPr>
-          <p:cNvPr id="31746" name="Content Placeholder 2"/>
-          <p:cNvSpPr>
-            <a:spLocks noGrp="1"/>
-          </p:cNvSpPr>
-          <p:nvPr>
-            <p:ph idx="1"/>
-          </p:nvPr>
-        </p:nvSpPr>
-        <p:spPr/>
-        <p:txBody>
-          <a:bodyPr/>
-          <a:lstStyle/>
-          <a:p>
-            <a:r>
-              <a:rPr lang="en-US" dirty="0">
-                <a:latin typeface="Calibri" charset="0"/>
-                <a:ea typeface="ＭＳ Ｐゴシック" charset="0"/>
-              </a:rPr>
-              <a:t>Which should I use?</a:t>
-            </a:r>
-          </a:p>
-          <a:p>
-            <a:r>
-              <a:rPr lang="en-US" dirty="0">
-                <a:latin typeface="Calibri" charset="0"/>
-                <a:ea typeface="ＭＳ Ｐゴシック" charset="0"/>
-              </a:rPr>
-              <a:t>FPKM</a:t>
-            </a:r>
-          </a:p>
-          <a:p>
-            <a:pPr lvl="1"/>
-            <a:r>
-              <a:rPr lang="en-US" dirty="0">
-                <a:latin typeface="Calibri" charset="0"/>
-                <a:ea typeface="ＭＳ Ｐゴシック" charset="0"/>
-              </a:rPr>
-              <a:t>When you want to leverage benefits of tuxedo suite</a:t>
-            </a:r>
-          </a:p>
-          <a:p>
-            <a:pPr lvl="1"/>
-            <a:r>
-              <a:rPr lang="en-US" dirty="0">
-                <a:latin typeface="Calibri" charset="0"/>
-                <a:ea typeface="ＭＳ Ｐゴシック" charset="0"/>
-              </a:rPr>
-              <a:t>Good for visualization (e.g., </a:t>
-            </a:r>
-            <a:r>
-              <a:rPr lang="en-US" dirty="0" err="1">
-                <a:latin typeface="Calibri" charset="0"/>
-                <a:ea typeface="ＭＳ Ｐゴシック" charset="0"/>
-              </a:rPr>
-              <a:t>heatmaps</a:t>
-            </a:r>
-            <a:r>
-              <a:rPr lang="en-US" dirty="0">
-                <a:latin typeface="Calibri" charset="0"/>
-                <a:ea typeface="ＭＳ Ｐゴシック" charset="0"/>
-              </a:rPr>
-              <a:t>)</a:t>
-            </a:r>
-          </a:p>
-          <a:p>
-            <a:pPr lvl="1"/>
-            <a:r>
-              <a:rPr lang="en-US" dirty="0">
-                <a:latin typeface="Calibri" charset="0"/>
-                <a:ea typeface="ＭＳ Ｐゴシック" charset="0"/>
-              </a:rPr>
-              <a:t>Calculating fold changes, </a:t>
-            </a:r>
-            <a:r>
-              <a:rPr lang="en-US" dirty="0" smtClean="0">
-                <a:latin typeface="Calibri" charset="0"/>
-                <a:ea typeface="ＭＳ Ｐゴシック" charset="0"/>
-              </a:rPr>
-              <a:t>etc.</a:t>
-            </a:r>
-            <a:endParaRPr lang="en-US" dirty="0">
-              <a:latin typeface="Calibri" charset="0"/>
-              <a:ea typeface="ＭＳ Ｐゴシック" charset="0"/>
-            </a:endParaRPr>
-          </a:p>
-          <a:p>
-            <a:r>
-              <a:rPr lang="en-US" dirty="0">
-                <a:latin typeface="Calibri" charset="0"/>
-                <a:ea typeface="ＭＳ Ｐゴシック" charset="0"/>
-              </a:rPr>
-              <a:t>Counts</a:t>
-            </a:r>
-          </a:p>
-          <a:p>
-            <a:pPr lvl="1"/>
-            <a:r>
-              <a:rPr lang="en-US" dirty="0">
-                <a:latin typeface="Calibri" charset="0"/>
-                <a:ea typeface="ＭＳ Ｐゴシック" charset="0"/>
-              </a:rPr>
-              <a:t>More robust statistical methods for differential </a:t>
-            </a:r>
-            <a:r>
-              <a:rPr lang="en-US" dirty="0" smtClean="0">
-                <a:latin typeface="Calibri" charset="0"/>
-                <a:ea typeface="ＭＳ Ｐゴシック" charset="0"/>
-              </a:rPr>
-              <a:t>expression</a:t>
-            </a:r>
-          </a:p>
-          <a:p>
-            <a:pPr lvl="1"/>
-            <a:r>
-              <a:rPr lang="en-US" dirty="0" smtClean="0">
-                <a:latin typeface="Calibri" charset="0"/>
-                <a:ea typeface="ＭＳ Ｐゴシック" charset="0"/>
-              </a:rPr>
-              <a:t>Accommodates more sophisticated experimental designs with appropriate statistical tests</a:t>
-            </a:r>
-            <a:endParaRPr lang="en-US" dirty="0">
-              <a:latin typeface="Calibri" charset="0"/>
-              <a:ea typeface="ＭＳ Ｐゴシック" charset="0"/>
-            </a:endParaRPr>
-          </a:p>
-        </p:txBody>
-      </p:sp>
-    </p:spTree>
-    <p:extLst>
-      <p:ext uri="{BB962C8B-B14F-4D97-AF65-F5344CB8AC3E}">
-        <p14:creationId xmlns:p14="http://schemas.microsoft.com/office/powerpoint/2010/main" val="1086031856"/>
-      </p:ext>
-    </p:extLst>
-  </p:cSld>
-  <p:clrMapOvr>
-    <a:masterClrMapping/>
-  </p:clrMapOvr>
-  <p:timing>
-    <p:tnLst>
-      <p:par>
-        <p:cTn xmlns:p14="http://schemas.microsoft.com/office/powerpoint/2010/main" id="1" dur="indefinite" restart="never" nodeType="tmRoot"/>
-      </p:par>
-    </p:tnLst>
-  </p:timing>
-</p:sld>
-</file>
-
-<file path=ppt/slides/slide16.xml><?xml version="1.0" encoding="utf-8"?>
-<p:sld xmlns:a="http://schemas.openxmlformats.org/drawingml/2006/main" xmlns:r="http://schemas.openxmlformats.org/officeDocument/2006/relationships" xmlns:p="http://schemas.openxmlformats.org/presentationml/2006/main">
-  <p:cSld>
-    <p:spTree>
-      <p:nvGrpSpPr>
-        <p:cNvPr id="1" name=""/>
-        <p:cNvGrpSpPr/>
-        <p:nvPr/>
-      </p:nvGrpSpPr>
-      <p:grpSpPr>
-        <a:xfrm>
-          <a:off x="0" y="0"/>
-          <a:ext cx="0" cy="0"/>
-          <a:chOff x="0" y="0"/>
-          <a:chExt cx="0" cy="0"/>
-        </a:xfrm>
-      </p:grpSpPr>
-      <p:sp>
-        <p:nvSpPr>
-          <p:cNvPr id="32769" name="Title 1"/>
-          <p:cNvSpPr>
-            <a:spLocks noGrp="1"/>
-          </p:cNvSpPr>
-          <p:nvPr>
-            <p:ph type="title"/>
-          </p:nvPr>
-        </p:nvSpPr>
-        <p:spPr/>
-        <p:txBody>
-          <a:bodyPr/>
-          <a:lstStyle/>
-          <a:p>
-            <a:r>
-              <a:rPr lang="en-US" dirty="0" smtClean="0">
-                <a:latin typeface="Calibri" charset="0"/>
-                <a:ea typeface="ＭＳ Ｐゴシック" charset="0"/>
-              </a:rPr>
-              <a:t>Alternative differential </a:t>
-            </a:r>
-            <a:r>
-              <a:rPr lang="en-US" dirty="0">
-                <a:latin typeface="Calibri" charset="0"/>
-                <a:ea typeface="ＭＳ Ｐゴシック" charset="0"/>
-              </a:rPr>
-              <a:t>expression methods</a:t>
-            </a:r>
-          </a:p>
-        </p:txBody>
-      </p:sp>
-      <p:sp>
-        <p:nvSpPr>
-          <p:cNvPr id="32770" name="Content Placeholder 2"/>
-          <p:cNvSpPr>
-            <a:spLocks noGrp="1"/>
-          </p:cNvSpPr>
-          <p:nvPr>
-            <p:ph idx="1"/>
-          </p:nvPr>
-        </p:nvSpPr>
-        <p:spPr/>
-        <p:txBody>
-          <a:bodyPr/>
-          <a:lstStyle/>
-          <a:p>
-            <a:r>
-              <a:rPr lang="en-US" dirty="0" smtClean="0">
-                <a:latin typeface="Calibri" charset="0"/>
-                <a:ea typeface="ＭＳ Ｐゴシック" charset="0"/>
-              </a:rPr>
-              <a:t>Raw count approaches</a:t>
-            </a:r>
-          </a:p>
-          <a:p>
-            <a:pPr lvl="1"/>
-            <a:r>
-              <a:rPr lang="en-US" dirty="0" err="1" smtClean="0">
-                <a:latin typeface="Calibri" charset="0"/>
-                <a:ea typeface="ＭＳ Ｐゴシック" charset="0"/>
-              </a:rPr>
-              <a:t>DESeq</a:t>
-            </a:r>
-            <a:r>
-              <a:rPr lang="en-US" dirty="0">
-                <a:latin typeface="Calibri" charset="0"/>
-                <a:ea typeface="ＭＳ Ｐゴシック" charset="0"/>
-              </a:rPr>
-              <a:t> - </a:t>
-            </a:r>
-            <a:r>
-              <a:rPr lang="en-US" dirty="0">
-                <a:latin typeface="Calibri" charset="0"/>
-                <a:ea typeface="ＭＳ Ｐゴシック" charset="0"/>
-                <a:hlinkClick r:id="rId2"/>
-              </a:rPr>
-              <a:t>http://www-huber.embl.de/users/anders/DESeq</a:t>
-            </a:r>
-            <a:r>
-              <a:rPr lang="en-US" dirty="0" smtClean="0">
-                <a:latin typeface="Calibri" charset="0"/>
-                <a:ea typeface="ＭＳ Ｐゴシック" charset="0"/>
-                <a:hlinkClick r:id="rId2"/>
-              </a:rPr>
-              <a:t>/</a:t>
-            </a:r>
-            <a:endParaRPr lang="en-US" dirty="0" smtClean="0">
-              <a:latin typeface="Calibri" charset="0"/>
-              <a:ea typeface="ＭＳ Ｐゴシック" charset="0"/>
-            </a:endParaRPr>
-          </a:p>
-          <a:p>
-            <a:pPr lvl="1"/>
-            <a:r>
-              <a:rPr lang="en-US" dirty="0" err="1" smtClean="0">
-                <a:latin typeface="Calibri" charset="0"/>
-                <a:ea typeface="ＭＳ Ｐゴシック" charset="0"/>
-              </a:rPr>
-              <a:t>edgeR</a:t>
-            </a:r>
-            <a:r>
-              <a:rPr lang="en-US" dirty="0" smtClean="0">
-                <a:latin typeface="Calibri" charset="0"/>
-                <a:ea typeface="ＭＳ Ｐゴシック" charset="0"/>
-              </a:rPr>
-              <a:t> </a:t>
-            </a:r>
-            <a:r>
-              <a:rPr lang="en-US" dirty="0">
-                <a:latin typeface="Calibri" charset="0"/>
-                <a:ea typeface="ＭＳ Ｐゴシック" charset="0"/>
-              </a:rPr>
-              <a:t>- </a:t>
-            </a:r>
-            <a:r>
-              <a:rPr lang="en-US" dirty="0">
-                <a:latin typeface="Calibri" charset="0"/>
-                <a:ea typeface="ＭＳ Ｐゴシック" charset="0"/>
-                <a:hlinkClick r:id="rId3"/>
-              </a:rPr>
-              <a:t>http://www.bioconductor.org/packages/release/bioc/html/</a:t>
-            </a:r>
-            <a:r>
-              <a:rPr lang="en-US" dirty="0" smtClean="0">
-                <a:latin typeface="Calibri" charset="0"/>
-                <a:ea typeface="ＭＳ Ｐゴシック" charset="0"/>
-                <a:hlinkClick r:id="rId3"/>
-              </a:rPr>
-              <a:t>edgeR.html</a:t>
-            </a:r>
-            <a:endParaRPr lang="en-US" dirty="0" smtClean="0">
-              <a:latin typeface="Calibri" charset="0"/>
-              <a:ea typeface="ＭＳ Ｐゴシック" charset="0"/>
-            </a:endParaRPr>
-          </a:p>
-          <a:p>
-            <a:pPr lvl="1"/>
-            <a:r>
-              <a:rPr lang="en-US" dirty="0" smtClean="0">
-                <a:latin typeface="Calibri" charset="0"/>
-                <a:ea typeface="ＭＳ Ｐゴシック" charset="0"/>
-              </a:rPr>
-              <a:t>Others…</a:t>
-            </a:r>
-          </a:p>
-          <a:p>
-            <a:pPr lvl="1"/>
-            <a:endParaRPr lang="en-US" dirty="0" smtClean="0">
-              <a:latin typeface="Calibri" charset="0"/>
-              <a:ea typeface="ＭＳ Ｐゴシック" charset="0"/>
-            </a:endParaRPr>
-          </a:p>
-          <a:p>
-            <a:pPr lvl="1"/>
-            <a:endParaRPr lang="en-US" dirty="0">
-              <a:latin typeface="Calibri" charset="0"/>
-              <a:ea typeface="ＭＳ Ｐゴシック" charset="0"/>
-            </a:endParaRPr>
-          </a:p>
-        </p:txBody>
-      </p:sp>
-    </p:spTree>
-    <p:extLst>
-      <p:ext uri="{BB962C8B-B14F-4D97-AF65-F5344CB8AC3E}">
-        <p14:creationId xmlns:p14="http://schemas.microsoft.com/office/powerpoint/2010/main" val="3735977598"/>
       </p:ext>
     </p:extLst>
   </p:cSld>
@@ -5946,8 +6375,8 @@
         </p:nvSpPr>
         <p:spPr>
           <a:xfrm>
-            <a:off x="152400" y="44624"/>
-            <a:ext cx="8839200" cy="1143000"/>
+            <a:off x="179512" y="44624"/>
+            <a:ext cx="8839200" cy="936104"/>
           </a:xfrm>
         </p:spPr>
         <p:txBody>
@@ -5955,47 +6384,75 @@
           <a:lstStyle/>
           <a:p>
             <a:r>
-              <a:rPr lang="en-US" dirty="0" smtClean="0"/>
-              <a:t>Multiple approaches advisable</a:t>
-            </a:r>
-            <a:endParaRPr lang="en-US" dirty="0"/>
+              <a:rPr lang="en-US" sz="2800" dirty="0" err="1" smtClean="0"/>
+              <a:t>HTSeq</a:t>
+            </a:r>
+            <a:r>
+              <a:rPr lang="en-US" sz="2800" dirty="0" smtClean="0"/>
+              <a:t>-count basically counts reads supporting a feature (exon, gene) by assessing overlapping coordinates</a:t>
+            </a:r>
+            <a:endParaRPr lang="en-US" sz="2800" dirty="0"/>
           </a:p>
         </p:txBody>
       </p:sp>
       <p:pic>
         <p:nvPicPr>
-          <p:cNvPr id="3" name="Picture 2" descr="Screen Shot 2013-06-01 at 10.13.40 PM.png"/>
+          <p:cNvPr id="4" name="Picture 3"/>
           <p:cNvPicPr>
             <a:picLocks noChangeAspect="1"/>
           </p:cNvPicPr>
           <p:nvPr/>
         </p:nvPicPr>
         <p:blipFill>
-          <a:blip r:embed="rId2">
-            <a:extLst>
-              <a:ext uri="{28A0092B-C50C-407E-A947-70E740481C1C}">
-                <a14:useLocalDpi xmlns:a14="http://schemas.microsoft.com/office/drawing/2010/main" val="0"/>
-              </a:ext>
-            </a:extLst>
-          </a:blip>
+          <a:blip r:embed="rId3"/>
           <a:stretch>
             <a:fillRect/>
           </a:stretch>
         </p:blipFill>
         <p:spPr>
           <a:xfrm>
-            <a:off x="1547664" y="1440160"/>
-            <a:ext cx="6078124" cy="4653136"/>
+            <a:off x="1729280" y="1124744"/>
+            <a:ext cx="5290992" cy="4752528"/>
           </a:xfrm>
           <a:prstGeom prst="rect">
             <a:avLst/>
           </a:prstGeom>
         </p:spPr>
       </p:pic>
+      <p:sp>
+        <p:nvSpPr>
+          <p:cNvPr id="5" name="TextBox 4"/>
+          <p:cNvSpPr txBox="1"/>
+          <p:nvPr/>
+        </p:nvSpPr>
+        <p:spPr>
+          <a:xfrm>
+            <a:off x="323527" y="5939988"/>
+            <a:ext cx="8712969" cy="369332"/>
+          </a:xfrm>
+          <a:prstGeom prst="rect">
+            <a:avLst/>
+          </a:prstGeom>
+          <a:noFill/>
+        </p:spPr>
+        <p:txBody>
+          <a:bodyPr wrap="square" rtlCol="0">
+            <a:spAutoFit/>
+          </a:bodyPr>
+          <a:lstStyle/>
+          <a:p>
+            <a:r>
+              <a:rPr lang="en-US" sz="1800" dirty="0" smtClean="0"/>
+              <a:t>Whether a read is counted depends on the nature of overlap and “mode” selected</a:t>
+            </a:r>
+            <a:endParaRPr lang="en-US" sz="1800" dirty="0"/>
+          </a:p>
+        </p:txBody>
+      </p:sp>
     </p:spTree>
     <p:extLst>
       <p:ext uri="{BB962C8B-B14F-4D97-AF65-F5344CB8AC3E}">
-        <p14:creationId xmlns:p14="http://schemas.microsoft.com/office/powerpoint/2010/main" val="3347952641"/>
+        <p14:creationId xmlns:p14="http://schemas.microsoft.com/office/powerpoint/2010/main" val="158908776"/>
       </p:ext>
     </p:extLst>
   </p:cSld>
@@ -6031,7 +6488,7 @@
       </p:grpSpPr>
       <p:sp>
         <p:nvSpPr>
-          <p:cNvPr id="34817" name="Title 1"/>
+          <p:cNvPr id="32769" name="Title 1"/>
           <p:cNvSpPr>
             <a:spLocks noGrp="1"/>
           </p:cNvSpPr>
@@ -6045,18 +6502,25 @@
           <a:lstStyle/>
           <a:p>
             <a:r>
-              <a:rPr lang="en-US">
-                <a:latin typeface="Calibri" charset="0"/>
-                <a:ea typeface="ＭＳ Ｐゴシック" charset="0"/>
-              </a:rPr>
-              <a:t>Lessons learned from microarray days</a:t>
+              <a:rPr lang="en-US" dirty="0" smtClean="0">
+                <a:latin typeface="Calibri" charset="0"/>
+                <a:ea typeface="ＭＳ Ｐゴシック" charset="0"/>
+              </a:rPr>
+              <a:t>Alternative differential </a:t>
+            </a:r>
+            <a:r>
+              <a:rPr lang="en-US" dirty="0">
+                <a:latin typeface="Calibri" charset="0"/>
+                <a:ea typeface="ＭＳ Ｐゴシック" charset="0"/>
+              </a:rPr>
+              <a:t>expression methods</a:t>
             </a:r>
           </a:p>
         </p:txBody>
       </p:sp>
       <p:sp>
         <p:nvSpPr>
-          <p:cNvPr id="34818" name="Content Placeholder 2"/>
+          <p:cNvPr id="32770" name="Content Placeholder 2"/>
           <p:cNvSpPr>
             <a:spLocks noGrp="1"/>
           </p:cNvSpPr>
@@ -6070,114 +6534,113 @@
           <a:lstStyle/>
           <a:p>
             <a:r>
+              <a:rPr lang="en-US" dirty="0" smtClean="0">
+                <a:latin typeface="Calibri" charset="0"/>
+                <a:ea typeface="ＭＳ Ｐゴシック" charset="0"/>
+              </a:rPr>
+              <a:t>Raw count approaches</a:t>
+            </a:r>
+          </a:p>
+          <a:p>
+            <a:pPr lvl="1"/>
+            <a:r>
+              <a:rPr lang="en-US" dirty="0" smtClean="0">
+                <a:latin typeface="Calibri" charset="0"/>
+                <a:ea typeface="ＭＳ Ｐゴシック" charset="0"/>
+              </a:rPr>
+              <a:t>DESeq2 </a:t>
+            </a:r>
+            <a:r>
               <a:rPr lang="en-US" dirty="0">
                 <a:latin typeface="Calibri" charset="0"/>
                 <a:ea typeface="ＭＳ Ｐゴシック" charset="0"/>
               </a:rPr>
-              <a:t>Hansen et al. “Sequencing Technology Does Not Eliminate Biological Variability.” Nature Biotechnology 29, no. 7 (2011): 572–573.</a:t>
-            </a:r>
-          </a:p>
-          <a:p>
+              <a:t>- </a:t>
+            </a:r>
             <a:r>
               <a:rPr lang="en-US" dirty="0">
                 <a:latin typeface="Calibri" charset="0"/>
                 <a:ea typeface="ＭＳ Ｐゴシック" charset="0"/>
-              </a:rPr>
-              <a:t>Power analysis for </a:t>
+                <a:hlinkClick r:id="rId2"/>
+              </a:rPr>
+              <a:t>http://www-huber.embl.de/users/anders/DESeq</a:t>
             </a:r>
             <a:r>
               <a:rPr lang="en-US" dirty="0" smtClean="0">
                 <a:latin typeface="Calibri" charset="0"/>
                 <a:ea typeface="ＭＳ Ｐゴシック" charset="0"/>
-              </a:rPr>
-              <a:t>RNA-seq </a:t>
-            </a:r>
-            <a:r>
-              <a:rPr lang="en-US" dirty="0">
-                <a:latin typeface="Calibri" charset="0"/>
-                <a:ea typeface="ＭＳ Ｐゴシック" charset="0"/>
-              </a:rPr>
-              <a:t>experiments</a:t>
-            </a:r>
-          </a:p>
-          <a:p>
-            <a:pPr lvl="1"/>
-            <a:r>
-              <a:rPr lang="en-US" dirty="0">
-                <a:latin typeface="Calibri" charset="0"/>
-                <a:ea typeface="ＭＳ Ｐゴシック" charset="0"/>
                 <a:hlinkClick r:id="rId2"/>
               </a:rPr>
-              <a:t>http://euler.bc.edu/marthlab/scotty/scotty.php</a:t>
-            </a:r>
-            <a:endParaRPr lang="en-US" dirty="0">
+              <a:t>/</a:t>
+            </a:r>
+            <a:endParaRPr lang="en-US" dirty="0" smtClean="0">
               <a:latin typeface="Calibri" charset="0"/>
               <a:ea typeface="ＭＳ Ｐゴシック" charset="0"/>
             </a:endParaRPr>
           </a:p>
           <a:p>
+            <a:pPr lvl="1"/>
+            <a:r>
+              <a:rPr lang="en-US" dirty="0" err="1" smtClean="0">
+                <a:latin typeface="Calibri" charset="0"/>
+                <a:ea typeface="ＭＳ Ｐゴシック" charset="0"/>
+              </a:rPr>
+              <a:t>edgeR</a:t>
+            </a:r>
             <a:r>
               <a:rPr lang="en-US" dirty="0" smtClean="0">
                 <a:latin typeface="Calibri" charset="0"/>
                 <a:ea typeface="ＭＳ Ｐゴシック" charset="0"/>
               </a:rPr>
-              <a:t>RNA-seq </a:t>
+              <a:t> </a:t>
             </a:r>
             <a:r>
               <a:rPr lang="en-US" dirty="0">
                 <a:latin typeface="Calibri" charset="0"/>
                 <a:ea typeface="ＭＳ Ｐゴシック" charset="0"/>
               </a:rPr>
-              <a:t>need for biological replicates</a:t>
-            </a:r>
-          </a:p>
-          <a:p>
-            <a:pPr lvl="1"/>
+              <a:t>- </a:t>
+            </a:r>
             <a:r>
               <a:rPr lang="en-US" dirty="0">
                 <a:latin typeface="Calibri" charset="0"/>
                 <a:ea typeface="ＭＳ Ｐゴシック" charset="0"/>
                 <a:hlinkClick r:id="rId3"/>
               </a:rPr>
-              <a:t>http://www.biostars.org/p/1161/</a:t>
-            </a:r>
-            <a:endParaRPr lang="en-US" dirty="0">
+              <a:t>http://www.bioconductor.org/packages/release/bioc/html/</a:t>
+            </a:r>
+            <a:r>
+              <a:rPr lang="en-US" dirty="0" smtClean="0">
+                <a:latin typeface="Calibri" charset="0"/>
+                <a:ea typeface="ＭＳ Ｐゴシック" charset="0"/>
+                <a:hlinkClick r:id="rId3"/>
+              </a:rPr>
+              <a:t>edgeR.html</a:t>
+            </a:r>
+            <a:endParaRPr lang="en-US" dirty="0" smtClean="0">
               <a:latin typeface="Calibri" charset="0"/>
               <a:ea typeface="ＭＳ Ｐゴシック" charset="0"/>
             </a:endParaRPr>
           </a:p>
           <a:p>
+            <a:pPr lvl="1"/>
             <a:r>
               <a:rPr lang="en-US" dirty="0" smtClean="0">
                 <a:latin typeface="Calibri" charset="0"/>
                 <a:ea typeface="ＭＳ Ｐゴシック" charset="0"/>
               </a:rPr>
-              <a:t>RNA-seq </a:t>
-            </a:r>
-            <a:r>
-              <a:rPr lang="en-US" dirty="0">
-                <a:latin typeface="Calibri" charset="0"/>
-                <a:ea typeface="ＭＳ Ｐゴシック" charset="0"/>
-              </a:rPr>
-              <a:t>study design</a:t>
+              <a:t>Others…</a:t>
             </a:r>
           </a:p>
           <a:p>
             <a:pPr lvl="1"/>
-            <a:r>
-              <a:rPr lang="en-US" dirty="0">
-                <a:latin typeface="Calibri" charset="0"/>
-                <a:ea typeface="ＭＳ Ｐゴシック" charset="0"/>
-                <a:hlinkClick r:id="rId4"/>
-              </a:rPr>
-              <a:t>http://www.biostars.org/p/68885/</a:t>
-            </a:r>
-            <a:endParaRPr lang="en-US" dirty="0">
+            <a:endParaRPr lang="en-US" dirty="0" smtClean="0">
               <a:latin typeface="Calibri" charset="0"/>
               <a:ea typeface="ＭＳ Ｐゴシック" charset="0"/>
             </a:endParaRPr>
           </a:p>
           <a:p>
+            <a:pPr lvl="1"/>
             <a:endParaRPr lang="en-US" dirty="0">
               <a:latin typeface="Calibri" charset="0"/>
               <a:ea typeface="ＭＳ Ｐゴシック" charset="0"/>
@@ -6188,7 +6651,7 @@
     </p:spTree>
     <p:extLst>
       <p:ext uri="{BB962C8B-B14F-4D97-AF65-F5344CB8AC3E}">
-        <p14:creationId xmlns:p14="http://schemas.microsoft.com/office/powerpoint/2010/main" val="3164191479"/>
+        <p14:creationId xmlns:p14="http://schemas.microsoft.com/office/powerpoint/2010/main" val="3735977598"/>
       </p:ext>
     </p:extLst>
   </p:cSld>
@@ -6224,7 +6687,7 @@
       </p:grpSpPr>
       <p:sp>
         <p:nvSpPr>
-          <p:cNvPr id="35841" name="Title 1"/>
+          <p:cNvPr id="31745" name="Title 1"/>
           <p:cNvSpPr>
             <a:spLocks noGrp="1"/>
           </p:cNvSpPr>
@@ -6234,8 +6697,8 @@
         </p:nvSpPr>
         <p:spPr>
           <a:xfrm>
-            <a:off x="152400" y="53752"/>
-            <a:ext cx="8839200" cy="1143000"/>
+            <a:off x="152400" y="-27384"/>
+            <a:ext cx="8839200" cy="864096"/>
           </a:xfrm>
         </p:spPr>
         <p:txBody>
@@ -6243,18 +6706,18 @@
           <a:lstStyle/>
           <a:p>
             <a:r>
-              <a:rPr lang="en-US" dirty="0">
-                <a:latin typeface="Calibri" charset="0"/>
-                <a:ea typeface="ＭＳ Ｐゴシック" charset="0"/>
-              </a:rPr>
-              <a:t>Multiple testing correction</a:t>
+              <a:rPr lang="en-US" sz="3600" dirty="0">
+                <a:latin typeface="Calibri" charset="0"/>
+                <a:ea typeface="ＭＳ Ｐゴシック" charset="0"/>
+              </a:rPr>
+              <a:t>‘FPKM’ expression estimates vs. ‘raw’ counts</a:t>
             </a:r>
           </a:p>
         </p:txBody>
       </p:sp>
       <p:sp>
         <p:nvSpPr>
-          <p:cNvPr id="35842" name="Content Placeholder 2"/>
+          <p:cNvPr id="31746" name="Content Placeholder 2"/>
           <p:cNvSpPr>
             <a:spLocks noGrp="1"/>
           </p:cNvSpPr>
@@ -6264,14 +6727,12 @@
         </p:nvSpPr>
         <p:spPr>
           <a:xfrm>
-            <a:off x="152400" y="1196752"/>
-            <a:ext cx="8839200" cy="4968552"/>
+            <a:off x="179512" y="908720"/>
+            <a:ext cx="8839200" cy="5328592"/>
           </a:xfrm>
         </p:spPr>
         <p:txBody>
-          <a:bodyPr>
-            <a:normAutofit fontScale="92500" lnSpcReduction="20000"/>
-          </a:bodyPr>
+          <a:bodyPr/>
           <a:lstStyle/>
           <a:p>
             <a:r>
@@ -6279,16 +6740,14 @@
                 <a:latin typeface="Calibri" charset="0"/>
                 <a:ea typeface="ＭＳ Ｐゴシック" charset="0"/>
               </a:rPr>
-              <a:t>As more attributes are compared, it becomes more likely that the treatment and control groups will appear to differ on at least one attribute by random chance alone.</a:t>
-            </a:r>
-          </a:p>
-          <a:p>
+              <a:t>Which should I use</a:t>
+            </a:r>
             <a:r>
               <a:rPr lang="en-US" dirty="0" smtClean="0">
                 <a:latin typeface="Calibri" charset="0"/>
                 <a:ea typeface="ＭＳ Ｐゴシック" charset="0"/>
               </a:rPr>
-              <a:t>Well known from array studies</a:t>
+              <a:t>?</a:t>
             </a:r>
           </a:p>
           <a:p>
@@ -6298,96 +6757,37 @@
                 <a:latin typeface="Calibri" charset="0"/>
                 <a:ea typeface="ＭＳ Ｐゴシック" charset="0"/>
               </a:rPr>
-              <a:t>10,000s genes/transcripts</a:t>
-            </a:r>
-          </a:p>
-          <a:p>
-            <a:pPr lvl="1"/>
-            <a:r>
-              <a:rPr lang="en-US" dirty="0" smtClean="0">
-                <a:latin typeface="Calibri" charset="0"/>
-                <a:ea typeface="ＭＳ Ｐゴシック" charset="0"/>
-              </a:rPr>
-              <a:t>100,000s exons</a:t>
-            </a:r>
-          </a:p>
-          <a:p>
-            <a:pPr marL="342900" lvl="1" indent="-342900">
-              <a:buFont typeface="Arial" charset="0"/>
-              <a:buChar char="•"/>
-            </a:pPr>
-            <a:r>
-              <a:rPr lang="en-US" dirty="0" smtClean="0">
-                <a:latin typeface="Calibri" charset="0"/>
-                <a:ea typeface="ＭＳ Ｐゴシック" charset="0"/>
-              </a:rPr>
-              <a:t>With RNA-</a:t>
-            </a:r>
-            <a:r>
-              <a:rPr lang="en-US" dirty="0" err="1" smtClean="0">
-                <a:latin typeface="Calibri" charset="0"/>
-                <a:ea typeface="ＭＳ Ｐゴシック" charset="0"/>
-              </a:rPr>
-              <a:t>seq</a:t>
-            </a:r>
-            <a:r>
-              <a:rPr lang="en-US" dirty="0">
-                <a:latin typeface="Calibri" charset="0"/>
-                <a:ea typeface="ＭＳ Ｐゴシック" charset="0"/>
-              </a:rPr>
-              <a:t>, </a:t>
-            </a:r>
-            <a:r>
-              <a:rPr lang="en-US" dirty="0" smtClean="0">
-                <a:latin typeface="Calibri" charset="0"/>
-                <a:ea typeface="ＭＳ Ｐゴシック" charset="0"/>
-              </a:rPr>
-              <a:t>more </a:t>
-            </a:r>
-            <a:r>
-              <a:rPr lang="en-US" dirty="0">
-                <a:latin typeface="Calibri" charset="0"/>
-                <a:ea typeface="ＭＳ Ｐゴシック" charset="0"/>
-              </a:rPr>
-              <a:t>of a problem than </a:t>
-            </a:r>
-            <a:r>
-              <a:rPr lang="en-US" dirty="0" smtClean="0">
-                <a:latin typeface="Calibri" charset="0"/>
-                <a:ea typeface="ＭＳ Ｐゴシック" charset="0"/>
-              </a:rPr>
-              <a:t>ever</a:t>
-            </a:r>
-          </a:p>
-          <a:p>
-            <a:pPr lvl="1"/>
-            <a:r>
-              <a:rPr lang="en-US" dirty="0" smtClean="0">
-                <a:latin typeface="Calibri" charset="0"/>
-                <a:ea typeface="ＭＳ Ｐゴシック" charset="0"/>
-              </a:rPr>
-              <a:t>All the complexity of the </a:t>
-            </a:r>
-            <a:r>
-              <a:rPr lang="en-US" dirty="0" err="1" smtClean="0">
-                <a:latin typeface="Calibri" charset="0"/>
-                <a:ea typeface="ＭＳ Ｐゴシック" charset="0"/>
-              </a:rPr>
-              <a:t>transcriptome</a:t>
-            </a:r>
-            <a:endParaRPr lang="en-US" dirty="0" smtClean="0">
+              <a:t>Long running debate with countless blogs and analyses arguing the advantages of each. The general consensus:</a:t>
+            </a:r>
+            <a:endParaRPr lang="en-US" dirty="0">
               <a:latin typeface="Calibri" charset="0"/>
               <a:ea typeface="ＭＳ Ｐゴシック" charset="0"/>
             </a:endParaRPr>
           </a:p>
           <a:p>
+            <a:r>
+              <a:rPr lang="en-US" dirty="0">
+                <a:latin typeface="Calibri" charset="0"/>
+                <a:ea typeface="ＭＳ Ｐゴシック" charset="0"/>
+              </a:rPr>
+              <a:t>FPKM</a:t>
+            </a:r>
+          </a:p>
+          <a:p>
             <a:pPr lvl="1"/>
             <a:r>
+              <a:rPr lang="en-US" dirty="0">
+                <a:latin typeface="Calibri" charset="0"/>
+                <a:ea typeface="ＭＳ Ｐゴシック" charset="0"/>
+              </a:rPr>
+              <a:t>When you want to leverage benefits of tuxedo </a:t>
+            </a:r>
+            <a:r>
               <a:rPr lang="en-US" dirty="0" smtClean="0">
                 <a:latin typeface="Calibri" charset="0"/>
                 <a:ea typeface="ＭＳ Ｐゴシック" charset="0"/>
               </a:rPr>
-              <a:t>Almost infinite number of potential features</a:t>
+              <a:t>suite</a:t>
             </a:r>
           </a:p>
           <a:p>
@@ -6397,86 +6797,99 @@
                 <a:latin typeface="Calibri" charset="0"/>
                 <a:ea typeface="ＭＳ Ｐゴシック" charset="0"/>
               </a:rPr>
-              <a:t>Genes, transcripts, exons, junctions, retained introns, microRNAs, </a:t>
+              <a:t>Isoform </a:t>
             </a:r>
             <a:r>
               <a:rPr lang="en-US" dirty="0" err="1" smtClean="0">
                 <a:latin typeface="Calibri" charset="0"/>
                 <a:ea typeface="ＭＳ Ｐゴシック" charset="0"/>
               </a:rPr>
-              <a:t>lncRNAs</a:t>
-            </a:r>
-            <a:r>
-              <a:rPr lang="en-US" dirty="0" smtClean="0">
-                <a:latin typeface="Calibri" charset="0"/>
-                <a:ea typeface="ＭＳ Ｐゴシック" charset="0"/>
-              </a:rPr>
-              <a:t>, </a:t>
-            </a:r>
-            <a:r>
-              <a:rPr lang="en-US" smtClean="0">
-                <a:latin typeface="Calibri" charset="0"/>
-                <a:ea typeface="ＭＳ Ｐゴシック" charset="0"/>
-              </a:rPr>
-              <a:t>etc</a:t>
-            </a:r>
-            <a:endParaRPr lang="en-US" dirty="0" smtClean="0">
+              <a:t>deconvolution</a:t>
+            </a:r>
+            <a:endParaRPr lang="en-US" dirty="0">
               <a:latin typeface="Calibri" charset="0"/>
               <a:ea typeface="ＭＳ Ｐゴシック" charset="0"/>
             </a:endParaRPr>
           </a:p>
           <a:p>
-            <a:r>
-              <a:rPr lang="en-US" dirty="0" err="1" smtClean="0">
-                <a:latin typeface="Calibri" charset="0"/>
-                <a:ea typeface="ＭＳ Ｐゴシック" charset="0"/>
-              </a:rPr>
-              <a:t>Bioconductor</a:t>
+            <a:pPr lvl="1"/>
+            <a:r>
+              <a:rPr lang="en-US" dirty="0">
+                <a:latin typeface="Calibri" charset="0"/>
+                <a:ea typeface="ＭＳ Ｐゴシック" charset="0"/>
+              </a:rPr>
+              <a:t>Good for visualization (e.g., </a:t>
+            </a:r>
+            <a:r>
+              <a:rPr lang="en-US" dirty="0" err="1">
+                <a:latin typeface="Calibri" charset="0"/>
+                <a:ea typeface="ＭＳ Ｐゴシック" charset="0"/>
+              </a:rPr>
+              <a:t>heatmaps</a:t>
+            </a:r>
+            <a:r>
+              <a:rPr lang="en-US" dirty="0">
+                <a:latin typeface="Calibri" charset="0"/>
+                <a:ea typeface="ＭＳ Ｐゴシック" charset="0"/>
+              </a:rPr>
+              <a:t>)</a:t>
+            </a:r>
+          </a:p>
+          <a:p>
+            <a:pPr lvl="1"/>
+            <a:r>
+              <a:rPr lang="en-US" dirty="0">
+                <a:latin typeface="Calibri" charset="0"/>
+                <a:ea typeface="ＭＳ Ｐゴシック" charset="0"/>
+              </a:rPr>
+              <a:t>Calculating fold changes, </a:t>
             </a:r>
             <a:r>
               <a:rPr lang="en-US" dirty="0" smtClean="0">
                 <a:latin typeface="Calibri" charset="0"/>
                 <a:ea typeface="ＭＳ Ｐゴシック" charset="0"/>
               </a:rPr>
-              <a:t> </a:t>
-            </a:r>
-            <a:r>
-              <a:rPr lang="en-US" dirty="0" err="1" smtClean="0">
-                <a:latin typeface="Calibri" charset="0"/>
-                <a:ea typeface="ＭＳ Ｐゴシック" charset="0"/>
-              </a:rPr>
-              <a:t>multtest</a:t>
-            </a:r>
-            <a:endParaRPr lang="en-US" dirty="0" smtClean="0">
+              <a:t>etc.</a:t>
+            </a:r>
+            <a:endParaRPr lang="en-US" dirty="0">
               <a:latin typeface="Calibri" charset="0"/>
               <a:ea typeface="ＭＳ Ｐゴシック" charset="0"/>
             </a:endParaRPr>
           </a:p>
           <a:p>
+            <a:r>
+              <a:rPr lang="en-US" dirty="0">
+                <a:latin typeface="Calibri" charset="0"/>
+                <a:ea typeface="ＭＳ Ｐゴシック" charset="0"/>
+              </a:rPr>
+              <a:t>Counts</a:t>
+            </a:r>
+          </a:p>
+          <a:p>
             <a:pPr lvl="1"/>
             <a:r>
+              <a:rPr lang="en-US" dirty="0">
+                <a:latin typeface="Calibri" charset="0"/>
+                <a:ea typeface="ＭＳ Ｐゴシック" charset="0"/>
+              </a:rPr>
+              <a:t>More robust statistical methods for differential </a:t>
+            </a:r>
+            <a:r>
               <a:rPr lang="en-US" dirty="0" smtClean="0">
                 <a:latin typeface="Calibri" charset="0"/>
                 <a:ea typeface="ＭＳ Ｐゴシック" charset="0"/>
-                <a:hlinkClick r:id="rId2"/>
-              </a:rPr>
-              <a:t>http</a:t>
-            </a:r>
-            <a:r>
-              <a:rPr lang="en-US" dirty="0">
-                <a:latin typeface="Calibri" charset="0"/>
-                <a:ea typeface="ＭＳ Ｐゴシック" charset="0"/>
-                <a:hlinkClick r:id="rId2"/>
-              </a:rPr>
-              <a:t>://www.bioconductor.org/packages/release/bioc/</a:t>
-            </a:r>
+              </a:rPr>
+              <a:t>expression</a:t>
+            </a:r>
+          </a:p>
+          <a:p>
+            <a:pPr lvl="1"/>
             <a:r>
               <a:rPr lang="en-US" dirty="0" smtClean="0">
                 <a:latin typeface="Calibri" charset="0"/>
                 <a:ea typeface="ＭＳ Ｐゴシック" charset="0"/>
-                <a:hlinkClick r:id="rId2"/>
-              </a:rPr>
-              <a:t>html/multtest.html</a:t>
+              </a:rPr>
+              <a:t>Accommodates more sophisticated experimental designs with appropriate statistical tests</a:t>
             </a:r>
             <a:endParaRPr lang="en-US" dirty="0">
               <a:latin typeface="Calibri" charset="0"/>
@@ -6488,7 +6901,7 @@
     </p:spTree>
     <p:extLst>
       <p:ext uri="{BB962C8B-B14F-4D97-AF65-F5344CB8AC3E}">
-        <p14:creationId xmlns:p14="http://schemas.microsoft.com/office/powerpoint/2010/main" val="1275607819"/>
+        <p14:creationId xmlns:p14="http://schemas.microsoft.com/office/powerpoint/2010/main" val="1086031856"/>
       </p:ext>
     </p:extLst>
   </p:cSld>
@@ -7099,7 +7512,7 @@
       </p:grpSpPr>
       <p:sp>
         <p:nvSpPr>
-          <p:cNvPr id="16385" name="Title 1"/>
+          <p:cNvPr id="2" name="Title 1"/>
           <p:cNvSpPr>
             <a:spLocks noGrp="1"/>
           </p:cNvSpPr>
@@ -7118,359 +7531,47 @@
           <a:lstStyle/>
           <a:p>
             <a:r>
-              <a:rPr lang="en-US" sz="3600" dirty="0">
-                <a:latin typeface="Calibri" charset="0"/>
-                <a:ea typeface="ＭＳ Ｐゴシック" charset="0"/>
-              </a:rPr>
-              <a:t>Downstream interpretation of expression </a:t>
-            </a:r>
-            <a:r>
-              <a:rPr lang="en-US" sz="3600" dirty="0" smtClean="0">
-                <a:latin typeface="Calibri" charset="0"/>
-                <a:ea typeface="ＭＳ Ｐゴシック" charset="0"/>
-              </a:rPr>
-              <a:t>analysis</a:t>
-            </a:r>
-            <a:endParaRPr lang="en-US" sz="3600" dirty="0">
-              <a:latin typeface="Calibri" charset="0"/>
-              <a:ea typeface="ＭＳ Ｐゴシック" charset="0"/>
-            </a:endParaRPr>
+              <a:rPr lang="en-US" dirty="0" smtClean="0"/>
+              <a:t>Multiple approaches advisable</a:t>
+            </a:r>
+            <a:endParaRPr lang="en-US" dirty="0"/>
           </a:p>
         </p:txBody>
       </p:sp>
-      <p:sp>
-        <p:nvSpPr>
-          <p:cNvPr id="2" name="Content Placeholder 1"/>
-          <p:cNvSpPr>
-            <a:spLocks noGrp="1"/>
-          </p:cNvSpPr>
-          <p:nvPr>
-            <p:ph idx="1"/>
-          </p:nvPr>
-        </p:nvSpPr>
+      <p:pic>
+        <p:nvPicPr>
+          <p:cNvPr id="3" name="Picture 2" descr="Screen Shot 2013-06-01 at 10.13.40 PM.png"/>
+          <p:cNvPicPr>
+            <a:picLocks noChangeAspect="1"/>
+          </p:cNvPicPr>
+          <p:nvPr/>
+        </p:nvPicPr>
+        <p:blipFill>
+          <a:blip r:embed="rId2">
+            <a:extLst>
+              <a:ext uri="{28A0092B-C50C-407E-A947-70E740481C1C}">
+                <a14:useLocalDpi xmlns:a14="http://schemas.microsoft.com/office/drawing/2010/main" val="0"/>
+              </a:ext>
+            </a:extLst>
+          </a:blip>
+          <a:stretch>
+            <a:fillRect/>
+          </a:stretch>
+        </p:blipFill>
         <p:spPr>
           <a:xfrm>
-            <a:off x="152400" y="1484784"/>
-            <a:ext cx="8839200" cy="4896544"/>
+            <a:off x="1547664" y="1440160"/>
+            <a:ext cx="6078124" cy="4653136"/>
           </a:xfrm>
+          <a:prstGeom prst="rect">
+            <a:avLst/>
+          </a:prstGeom>
         </p:spPr>
-        <p:txBody>
-          <a:bodyPr>
-            <a:normAutofit fontScale="62500" lnSpcReduction="20000"/>
-          </a:bodyPr>
-          <a:lstStyle/>
-          <a:p>
-            <a:r>
-              <a:rPr lang="en-US" dirty="0" smtClean="0">
-                <a:latin typeface="Calibri" charset="0"/>
-                <a:ea typeface="ＭＳ Ｐゴシック" charset="0"/>
-              </a:rPr>
-              <a:t>Topic for an entire course</a:t>
-            </a:r>
-          </a:p>
-          <a:p>
-            <a:r>
-              <a:rPr lang="en-US" dirty="0" smtClean="0">
-                <a:latin typeface="Calibri" charset="0"/>
-                <a:ea typeface="ＭＳ Ｐゴシック" charset="0"/>
-              </a:rPr>
-              <a:t>Expression estimates and differential expression lists from </a:t>
-            </a:r>
-            <a:r>
-              <a:rPr lang="en-US" dirty="0" err="1" smtClean="0">
-                <a:latin typeface="Calibri" charset="0"/>
-                <a:ea typeface="ＭＳ Ｐゴシック" charset="0"/>
-              </a:rPr>
-              <a:t>StringTie</a:t>
-            </a:r>
-            <a:r>
-              <a:rPr lang="en-US" dirty="0" smtClean="0">
-                <a:latin typeface="Calibri" charset="0"/>
-                <a:ea typeface="ＭＳ Ｐゴシック" charset="0"/>
-              </a:rPr>
-              <a:t>, </a:t>
-            </a:r>
-            <a:r>
-              <a:rPr lang="en-US" dirty="0" err="1" smtClean="0">
-                <a:latin typeface="Calibri" charset="0"/>
-                <a:ea typeface="ＭＳ Ｐゴシック" charset="0"/>
-              </a:rPr>
-              <a:t>Ballgown</a:t>
-            </a:r>
-            <a:r>
-              <a:rPr lang="en-US" dirty="0" smtClean="0">
-                <a:latin typeface="Calibri" charset="0"/>
-                <a:ea typeface="ＭＳ Ｐゴシック" charset="0"/>
-              </a:rPr>
-              <a:t> or other alternatives can be fed into many analysis pipelines</a:t>
-            </a:r>
-          </a:p>
-          <a:p>
-            <a:r>
-              <a:rPr lang="en-US" dirty="0" smtClean="0">
-                <a:latin typeface="Calibri" charset="0"/>
-                <a:ea typeface="ＭＳ Ｐゴシック" charset="0"/>
-              </a:rPr>
-              <a:t>See supplemental R tutorial for how to format expression data and start manipulating in R</a:t>
-            </a:r>
-            <a:endParaRPr lang="en-US" dirty="0">
-              <a:latin typeface="Calibri" charset="0"/>
-              <a:ea typeface="ＭＳ Ｐゴシック" charset="0"/>
-            </a:endParaRPr>
-          </a:p>
-          <a:p>
-            <a:r>
-              <a:rPr lang="en-US" dirty="0" smtClean="0">
-                <a:latin typeface="Calibri" charset="0"/>
-                <a:ea typeface="ＭＳ Ｐゴシック" charset="0"/>
-              </a:rPr>
-              <a:t>Clustering/</a:t>
-            </a:r>
-            <a:r>
-              <a:rPr lang="en-US" dirty="0" err="1" smtClean="0">
-                <a:latin typeface="Calibri" charset="0"/>
-                <a:ea typeface="ＭＳ Ｐゴシック" charset="0"/>
-              </a:rPr>
-              <a:t>Heatmaps</a:t>
-            </a:r>
-            <a:endParaRPr lang="en-US" dirty="0" smtClean="0">
-              <a:latin typeface="Calibri" charset="0"/>
-              <a:ea typeface="ＭＳ Ｐゴシック" charset="0"/>
-            </a:endParaRPr>
-          </a:p>
-          <a:p>
-            <a:pPr lvl="1"/>
-            <a:r>
-              <a:rPr lang="en-US" dirty="0" smtClean="0">
-                <a:latin typeface="Calibri" charset="0"/>
-                <a:ea typeface="ＭＳ Ｐゴシック" charset="0"/>
-              </a:rPr>
-              <a:t>Provided by </a:t>
-            </a:r>
-            <a:r>
-              <a:rPr lang="en-US" dirty="0" err="1" smtClean="0">
-                <a:latin typeface="Calibri" charset="0"/>
-                <a:ea typeface="ＭＳ Ｐゴシック" charset="0"/>
-              </a:rPr>
-              <a:t>cummeRbund</a:t>
-            </a:r>
-            <a:endParaRPr lang="en-US" dirty="0">
-              <a:latin typeface="Calibri" charset="0"/>
-              <a:ea typeface="ＭＳ Ｐゴシック" charset="0"/>
-            </a:endParaRPr>
-          </a:p>
-          <a:p>
-            <a:pPr lvl="1"/>
-            <a:r>
-              <a:rPr lang="en-US" dirty="0" smtClean="0">
-                <a:latin typeface="Calibri" charset="0"/>
-                <a:ea typeface="ＭＳ Ｐゴシック" charset="0"/>
-              </a:rPr>
-              <a:t>For more customized analysis various R packages exist: </a:t>
-            </a:r>
-          </a:p>
-          <a:p>
-            <a:pPr lvl="2"/>
-            <a:r>
-              <a:rPr lang="en-US" dirty="0" err="1">
-                <a:latin typeface="Calibri" charset="0"/>
-                <a:ea typeface="ＭＳ Ｐゴシック" charset="0"/>
-              </a:rPr>
-              <a:t>h</a:t>
-            </a:r>
-            <a:r>
-              <a:rPr lang="en-US" dirty="0" err="1" smtClean="0">
-                <a:latin typeface="Calibri" charset="0"/>
-                <a:ea typeface="ＭＳ Ｐゴシック" charset="0"/>
-              </a:rPr>
-              <a:t>clust</a:t>
-            </a:r>
-            <a:r>
-              <a:rPr lang="en-US" dirty="0" smtClean="0">
-                <a:latin typeface="Calibri" charset="0"/>
-                <a:ea typeface="ＭＳ Ｐゴシック" charset="0"/>
-              </a:rPr>
-              <a:t>, heatmap.2,</a:t>
-            </a:r>
-            <a:r>
-              <a:rPr lang="en-US" dirty="0">
-                <a:latin typeface="Calibri" charset="0"/>
-                <a:ea typeface="ＭＳ Ｐゴシック" charset="0"/>
-              </a:rPr>
-              <a:t> </a:t>
-            </a:r>
-            <a:r>
-              <a:rPr lang="en-US" dirty="0" err="1" smtClean="0">
-                <a:latin typeface="Calibri" charset="0"/>
-                <a:ea typeface="ＭＳ Ｐゴシック" charset="0"/>
-              </a:rPr>
-              <a:t>plotrix</a:t>
-            </a:r>
-            <a:r>
-              <a:rPr lang="en-US" dirty="0" smtClean="0">
-                <a:latin typeface="Calibri" charset="0"/>
-                <a:ea typeface="ＭＳ Ｐゴシック" charset="0"/>
-              </a:rPr>
-              <a:t>, ggplot2, etc.</a:t>
-            </a:r>
-          </a:p>
-          <a:p>
-            <a:r>
-              <a:rPr lang="en-US" dirty="0" smtClean="0">
-                <a:latin typeface="Calibri" charset="0"/>
-                <a:ea typeface="ＭＳ Ｐゴシック" charset="0"/>
-              </a:rPr>
-              <a:t>Classification</a:t>
-            </a:r>
-          </a:p>
-          <a:p>
-            <a:pPr lvl="1"/>
-            <a:r>
-              <a:rPr lang="en-US" dirty="0" smtClean="0">
-                <a:latin typeface="Calibri" charset="0"/>
-                <a:ea typeface="ＭＳ Ｐゴシック" charset="0"/>
-              </a:rPr>
-              <a:t>For RNA-seq data we still rarely have sufficient sample size and clinical details but this is changing</a:t>
-            </a:r>
-          </a:p>
-          <a:p>
-            <a:pPr lvl="2"/>
-            <a:r>
-              <a:rPr lang="en-US" dirty="0" err="1" smtClean="0">
-                <a:latin typeface="Calibri" charset="0"/>
-                <a:ea typeface="ＭＳ Ｐゴシック" charset="0"/>
-              </a:rPr>
-              <a:t>Weka</a:t>
-            </a:r>
-            <a:r>
-              <a:rPr lang="en-US" dirty="0" smtClean="0">
-                <a:latin typeface="Calibri" charset="0"/>
-                <a:ea typeface="ＭＳ Ｐゴシック" charset="0"/>
-              </a:rPr>
-              <a:t> is a good learning tool</a:t>
-            </a:r>
-          </a:p>
-          <a:p>
-            <a:pPr lvl="2"/>
-            <a:r>
-              <a:rPr lang="en-US" dirty="0" err="1" smtClean="0">
-                <a:latin typeface="Calibri" charset="0"/>
-                <a:ea typeface="ＭＳ Ｐゴシック" charset="0"/>
-              </a:rPr>
-              <a:t>RandomForests</a:t>
-            </a:r>
-            <a:r>
-              <a:rPr lang="en-US" dirty="0" smtClean="0">
-                <a:latin typeface="Calibri" charset="0"/>
-                <a:ea typeface="ＭＳ Ｐゴシック" charset="0"/>
-              </a:rPr>
-              <a:t> R package (</a:t>
-            </a:r>
-            <a:r>
-              <a:rPr lang="en-US" dirty="0" err="1" smtClean="0">
-                <a:latin typeface="Calibri" charset="0"/>
-                <a:ea typeface="ＭＳ Ｐゴシック" charset="0"/>
-              </a:rPr>
-              <a:t>biostar</a:t>
-            </a:r>
-            <a:r>
-              <a:rPr lang="en-US" dirty="0" smtClean="0">
-                <a:latin typeface="Calibri" charset="0"/>
-                <a:ea typeface="ＭＳ Ｐゴシック" charset="0"/>
-              </a:rPr>
-              <a:t> tutorial being developed)</a:t>
-            </a:r>
-          </a:p>
-          <a:p>
-            <a:r>
-              <a:rPr lang="en-US" dirty="0" smtClean="0">
-                <a:latin typeface="Calibri" charset="0"/>
-                <a:ea typeface="ＭＳ Ｐゴシック" charset="0"/>
-              </a:rPr>
-              <a:t>Pathway analysis</a:t>
-            </a:r>
-          </a:p>
-          <a:p>
-            <a:pPr lvl="1"/>
-            <a:r>
-              <a:rPr lang="en-US" dirty="0" smtClean="0">
-                <a:latin typeface="Calibri" charset="0"/>
-                <a:ea typeface="ＭＳ Ｐゴシック" charset="0"/>
-              </a:rPr>
-              <a:t>IPA</a:t>
-            </a:r>
-          </a:p>
-          <a:p>
-            <a:pPr lvl="1"/>
-            <a:r>
-              <a:rPr lang="en-US" dirty="0" err="1" smtClean="0">
-                <a:latin typeface="Calibri" charset="0"/>
-                <a:ea typeface="ＭＳ Ｐゴシック" charset="0"/>
-              </a:rPr>
-              <a:t>Cytoscape</a:t>
-            </a:r>
-            <a:endParaRPr lang="en-US" dirty="0" smtClean="0">
-              <a:latin typeface="Calibri" charset="0"/>
-              <a:ea typeface="ＭＳ Ｐゴシック" charset="0"/>
-            </a:endParaRPr>
-          </a:p>
-          <a:p>
-            <a:pPr lvl="1"/>
-            <a:r>
-              <a:rPr lang="en-US" dirty="0" smtClean="0">
-                <a:latin typeface="Calibri" charset="0"/>
-                <a:ea typeface="ＭＳ Ｐゴシック" charset="0"/>
-              </a:rPr>
-              <a:t>Many R/</a:t>
-            </a:r>
-            <a:r>
-              <a:rPr lang="en-US" dirty="0" err="1" smtClean="0">
-                <a:latin typeface="Calibri" charset="0"/>
-                <a:ea typeface="ＭＳ Ｐゴシック" charset="0"/>
-              </a:rPr>
-              <a:t>BioConductor</a:t>
-            </a:r>
-            <a:r>
-              <a:rPr lang="en-US" dirty="0">
-                <a:latin typeface="Calibri" charset="0"/>
-                <a:ea typeface="ＭＳ Ｐゴシック" charset="0"/>
-              </a:rPr>
-              <a:t> packages: </a:t>
-            </a:r>
-            <a:r>
-              <a:rPr lang="en-US" dirty="0">
-                <a:latin typeface="Calibri" charset="0"/>
-                <a:ea typeface="ＭＳ Ｐゴシック" charset="0"/>
-                <a:hlinkClick r:id="rId2"/>
-              </a:rPr>
-              <a:t>http://www.bioconductor.org/help/search/index.html?q=</a:t>
-            </a:r>
-            <a:r>
-              <a:rPr lang="en-US" dirty="0" smtClean="0">
-                <a:latin typeface="Calibri" charset="0"/>
-                <a:ea typeface="ＭＳ Ｐゴシック" charset="0"/>
-                <a:hlinkClick r:id="rId2"/>
-              </a:rPr>
-              <a:t>pathway</a:t>
-            </a:r>
-            <a:endParaRPr lang="en-US" dirty="0" smtClean="0">
-              <a:latin typeface="Calibri" charset="0"/>
-              <a:ea typeface="ＭＳ Ｐゴシック" charset="0"/>
-            </a:endParaRPr>
-          </a:p>
-          <a:p>
-            <a:pPr lvl="1"/>
-            <a:endParaRPr lang="en-US" dirty="0" smtClean="0">
-              <a:latin typeface="Calibri" charset="0"/>
-              <a:ea typeface="ＭＳ Ｐゴシック" charset="0"/>
-            </a:endParaRPr>
-          </a:p>
-        </p:txBody>
-      </p:sp>
+      </p:pic>
     </p:spTree>
     <p:extLst>
       <p:ext uri="{BB962C8B-B14F-4D97-AF65-F5344CB8AC3E}">
-        <p14:creationId xmlns:p14="http://schemas.microsoft.com/office/powerpoint/2010/main" val="4086693407"/>
+        <p14:creationId xmlns:p14="http://schemas.microsoft.com/office/powerpoint/2010/main" val="3347952641"/>
       </p:ext>
     </p:extLst>
   </p:cSld>
@@ -7506,6 +7607,906 @@
       </p:grpSpPr>
       <p:sp>
         <p:nvSpPr>
+          <p:cNvPr id="34817" name="Title 1"/>
+          <p:cNvSpPr>
+            <a:spLocks noGrp="1"/>
+          </p:cNvSpPr>
+          <p:nvPr>
+            <p:ph type="title"/>
+          </p:nvPr>
+        </p:nvSpPr>
+        <p:spPr/>
+        <p:txBody>
+          <a:bodyPr/>
+          <a:lstStyle/>
+          <a:p>
+            <a:r>
+              <a:rPr lang="en-US">
+                <a:latin typeface="Calibri" charset="0"/>
+                <a:ea typeface="ＭＳ Ｐゴシック" charset="0"/>
+              </a:rPr>
+              <a:t>Lessons learned from microarray days</a:t>
+            </a:r>
+          </a:p>
+        </p:txBody>
+      </p:sp>
+      <p:sp>
+        <p:nvSpPr>
+          <p:cNvPr id="34818" name="Content Placeholder 2"/>
+          <p:cNvSpPr>
+            <a:spLocks noGrp="1"/>
+          </p:cNvSpPr>
+          <p:nvPr>
+            <p:ph idx="1"/>
+          </p:nvPr>
+        </p:nvSpPr>
+        <p:spPr/>
+        <p:txBody>
+          <a:bodyPr/>
+          <a:lstStyle/>
+          <a:p>
+            <a:r>
+              <a:rPr lang="en-US" dirty="0">
+                <a:latin typeface="Calibri" charset="0"/>
+                <a:ea typeface="ＭＳ Ｐゴシック" charset="0"/>
+              </a:rPr>
+              <a:t>Hansen et al. “Sequencing Technology Does Not Eliminate Biological Variability.” Nature Biotechnology 29, no. 7 (2011): 572–573.</a:t>
+            </a:r>
+          </a:p>
+          <a:p>
+            <a:r>
+              <a:rPr lang="en-US" dirty="0">
+                <a:latin typeface="Calibri" charset="0"/>
+                <a:ea typeface="ＭＳ Ｐゴシック" charset="0"/>
+              </a:rPr>
+              <a:t>Power analysis for </a:t>
+            </a:r>
+            <a:r>
+              <a:rPr lang="en-US" dirty="0" smtClean="0">
+                <a:latin typeface="Calibri" charset="0"/>
+                <a:ea typeface="ＭＳ Ｐゴシック" charset="0"/>
+              </a:rPr>
+              <a:t>RNA-seq </a:t>
+            </a:r>
+            <a:r>
+              <a:rPr lang="en-US" dirty="0">
+                <a:latin typeface="Calibri" charset="0"/>
+                <a:ea typeface="ＭＳ Ｐゴシック" charset="0"/>
+              </a:rPr>
+              <a:t>experiments</a:t>
+            </a:r>
+          </a:p>
+          <a:p>
+            <a:pPr lvl="1"/>
+            <a:r>
+              <a:rPr lang="en-US" dirty="0">
+                <a:latin typeface="Calibri" charset="0"/>
+                <a:ea typeface="ＭＳ Ｐゴシック" charset="0"/>
+                <a:hlinkClick r:id="rId2"/>
+              </a:rPr>
+              <a:t>http://euler.bc.edu/marthlab/scotty/scotty.php</a:t>
+            </a:r>
+            <a:endParaRPr lang="en-US" dirty="0">
+              <a:latin typeface="Calibri" charset="0"/>
+              <a:ea typeface="ＭＳ Ｐゴシック" charset="0"/>
+            </a:endParaRPr>
+          </a:p>
+          <a:p>
+            <a:r>
+              <a:rPr lang="en-US" dirty="0" smtClean="0">
+                <a:latin typeface="Calibri" charset="0"/>
+                <a:ea typeface="ＭＳ Ｐゴシック" charset="0"/>
+              </a:rPr>
+              <a:t>RNA-seq </a:t>
+            </a:r>
+            <a:r>
+              <a:rPr lang="en-US" dirty="0">
+                <a:latin typeface="Calibri" charset="0"/>
+                <a:ea typeface="ＭＳ Ｐゴシック" charset="0"/>
+              </a:rPr>
+              <a:t>need for biological replicates</a:t>
+            </a:r>
+          </a:p>
+          <a:p>
+            <a:pPr lvl="1"/>
+            <a:r>
+              <a:rPr lang="en-US" dirty="0">
+                <a:latin typeface="Calibri" charset="0"/>
+                <a:ea typeface="ＭＳ Ｐゴシック" charset="0"/>
+                <a:hlinkClick r:id="rId3"/>
+              </a:rPr>
+              <a:t>http://www.biostars.org/p/1161/</a:t>
+            </a:r>
+            <a:endParaRPr lang="en-US" dirty="0">
+              <a:latin typeface="Calibri" charset="0"/>
+              <a:ea typeface="ＭＳ Ｐゴシック" charset="0"/>
+            </a:endParaRPr>
+          </a:p>
+          <a:p>
+            <a:r>
+              <a:rPr lang="en-US" dirty="0" smtClean="0">
+                <a:latin typeface="Calibri" charset="0"/>
+                <a:ea typeface="ＭＳ Ｐゴシック" charset="0"/>
+              </a:rPr>
+              <a:t>RNA-seq </a:t>
+            </a:r>
+            <a:r>
+              <a:rPr lang="en-US" dirty="0">
+                <a:latin typeface="Calibri" charset="0"/>
+                <a:ea typeface="ＭＳ Ｐゴシック" charset="0"/>
+              </a:rPr>
+              <a:t>study design</a:t>
+            </a:r>
+          </a:p>
+          <a:p>
+            <a:pPr lvl="1"/>
+            <a:r>
+              <a:rPr lang="en-US" dirty="0">
+                <a:latin typeface="Calibri" charset="0"/>
+                <a:ea typeface="ＭＳ Ｐゴシック" charset="0"/>
+                <a:hlinkClick r:id="rId4"/>
+              </a:rPr>
+              <a:t>http://www.biostars.org/p/68885/</a:t>
+            </a:r>
+            <a:endParaRPr lang="en-US" dirty="0">
+              <a:latin typeface="Calibri" charset="0"/>
+              <a:ea typeface="ＭＳ Ｐゴシック" charset="0"/>
+            </a:endParaRPr>
+          </a:p>
+          <a:p>
+            <a:endParaRPr lang="en-US" dirty="0">
+              <a:latin typeface="Calibri" charset="0"/>
+              <a:ea typeface="ＭＳ Ｐゴシック" charset="0"/>
+            </a:endParaRPr>
+          </a:p>
+        </p:txBody>
+      </p:sp>
+    </p:spTree>
+    <p:extLst>
+      <p:ext uri="{BB962C8B-B14F-4D97-AF65-F5344CB8AC3E}">
+        <p14:creationId xmlns:p14="http://schemas.microsoft.com/office/powerpoint/2010/main" val="3164191479"/>
+      </p:ext>
+    </p:extLst>
+  </p:cSld>
+  <p:clrMapOvr>
+    <a:masterClrMapping/>
+  </p:clrMapOvr>
+  <p:timing>
+    <p:tnLst>
+      <p:par>
+        <p:cTn xmlns:p14="http://schemas.microsoft.com/office/powerpoint/2010/main" id="1" dur="indefinite" restart="never" nodeType="tmRoot"/>
+      </p:par>
+    </p:tnLst>
+  </p:timing>
+</p:sld>
+</file>
+
+<file path=ppt/slides/slide22.xml><?xml version="1.0" encoding="utf-8"?>
+<p:sld xmlns:a="http://schemas.openxmlformats.org/drawingml/2006/main" xmlns:r="http://schemas.openxmlformats.org/officeDocument/2006/relationships" xmlns:p="http://schemas.openxmlformats.org/presentationml/2006/main">
+  <p:cSld>
+    <p:spTree>
+      <p:nvGrpSpPr>
+        <p:cNvPr id="1" name=""/>
+        <p:cNvGrpSpPr/>
+        <p:nvPr/>
+      </p:nvGrpSpPr>
+      <p:grpSpPr>
+        <a:xfrm>
+          <a:off x="0" y="0"/>
+          <a:ext cx="0" cy="0"/>
+          <a:chOff x="0" y="0"/>
+          <a:chExt cx="0" cy="0"/>
+        </a:xfrm>
+      </p:grpSpPr>
+      <p:sp>
+        <p:nvSpPr>
+          <p:cNvPr id="35841" name="Title 1"/>
+          <p:cNvSpPr>
+            <a:spLocks noGrp="1"/>
+          </p:cNvSpPr>
+          <p:nvPr>
+            <p:ph type="title"/>
+          </p:nvPr>
+        </p:nvSpPr>
+        <p:spPr>
+          <a:xfrm>
+            <a:off x="152400" y="53752"/>
+            <a:ext cx="8839200" cy="1143000"/>
+          </a:xfrm>
+        </p:spPr>
+        <p:txBody>
+          <a:bodyPr/>
+          <a:lstStyle/>
+          <a:p>
+            <a:r>
+              <a:rPr lang="en-US" dirty="0">
+                <a:latin typeface="Calibri" charset="0"/>
+                <a:ea typeface="ＭＳ Ｐゴシック" charset="0"/>
+              </a:rPr>
+              <a:t>Multiple testing correction</a:t>
+            </a:r>
+          </a:p>
+        </p:txBody>
+      </p:sp>
+      <p:sp>
+        <p:nvSpPr>
+          <p:cNvPr id="35842" name="Content Placeholder 2"/>
+          <p:cNvSpPr>
+            <a:spLocks noGrp="1"/>
+          </p:cNvSpPr>
+          <p:nvPr>
+            <p:ph idx="1"/>
+          </p:nvPr>
+        </p:nvSpPr>
+        <p:spPr>
+          <a:xfrm>
+            <a:off x="152400" y="1196752"/>
+            <a:ext cx="8839200" cy="4968552"/>
+          </a:xfrm>
+        </p:spPr>
+        <p:txBody>
+          <a:bodyPr>
+            <a:normAutofit fontScale="92500" lnSpcReduction="20000"/>
+          </a:bodyPr>
+          <a:lstStyle/>
+          <a:p>
+            <a:r>
+              <a:rPr lang="en-US" dirty="0">
+                <a:latin typeface="Calibri" charset="0"/>
+                <a:ea typeface="ＭＳ Ｐゴシック" charset="0"/>
+              </a:rPr>
+              <a:t>As more attributes are compared, it becomes more likely that the treatment and control groups will appear to differ on at least one attribute by random chance alone.</a:t>
+            </a:r>
+          </a:p>
+          <a:p>
+            <a:r>
+              <a:rPr lang="en-US" dirty="0" smtClean="0">
+                <a:latin typeface="Calibri" charset="0"/>
+                <a:ea typeface="ＭＳ Ｐゴシック" charset="0"/>
+              </a:rPr>
+              <a:t>Well known from array studies</a:t>
+            </a:r>
+          </a:p>
+          <a:p>
+            <a:pPr lvl="1"/>
+            <a:r>
+              <a:rPr lang="en-US" dirty="0" smtClean="0">
+                <a:latin typeface="Calibri" charset="0"/>
+                <a:ea typeface="ＭＳ Ｐゴシック" charset="0"/>
+              </a:rPr>
+              <a:t>10,000s genes/transcripts</a:t>
+            </a:r>
+          </a:p>
+          <a:p>
+            <a:pPr lvl="1"/>
+            <a:r>
+              <a:rPr lang="en-US" dirty="0" smtClean="0">
+                <a:latin typeface="Calibri" charset="0"/>
+                <a:ea typeface="ＭＳ Ｐゴシック" charset="0"/>
+              </a:rPr>
+              <a:t>100,000s exons</a:t>
+            </a:r>
+          </a:p>
+          <a:p>
+            <a:pPr marL="342900" lvl="1" indent="-342900">
+              <a:buFont typeface="Arial" charset="0"/>
+              <a:buChar char="•"/>
+            </a:pPr>
+            <a:r>
+              <a:rPr lang="en-US" dirty="0" smtClean="0">
+                <a:latin typeface="Calibri" charset="0"/>
+                <a:ea typeface="ＭＳ Ｐゴシック" charset="0"/>
+              </a:rPr>
+              <a:t>With RNA-</a:t>
+            </a:r>
+            <a:r>
+              <a:rPr lang="en-US" dirty="0" err="1" smtClean="0">
+                <a:latin typeface="Calibri" charset="0"/>
+                <a:ea typeface="ＭＳ Ｐゴシック" charset="0"/>
+              </a:rPr>
+              <a:t>seq</a:t>
+            </a:r>
+            <a:r>
+              <a:rPr lang="en-US" dirty="0">
+                <a:latin typeface="Calibri" charset="0"/>
+                <a:ea typeface="ＭＳ Ｐゴシック" charset="0"/>
+              </a:rPr>
+              <a:t>, </a:t>
+            </a:r>
+            <a:r>
+              <a:rPr lang="en-US" dirty="0" smtClean="0">
+                <a:latin typeface="Calibri" charset="0"/>
+                <a:ea typeface="ＭＳ Ｐゴシック" charset="0"/>
+              </a:rPr>
+              <a:t>more </a:t>
+            </a:r>
+            <a:r>
+              <a:rPr lang="en-US" dirty="0">
+                <a:latin typeface="Calibri" charset="0"/>
+                <a:ea typeface="ＭＳ Ｐゴシック" charset="0"/>
+              </a:rPr>
+              <a:t>of a problem than </a:t>
+            </a:r>
+            <a:r>
+              <a:rPr lang="en-US" dirty="0" smtClean="0">
+                <a:latin typeface="Calibri" charset="0"/>
+                <a:ea typeface="ＭＳ Ｐゴシック" charset="0"/>
+              </a:rPr>
+              <a:t>ever</a:t>
+            </a:r>
+          </a:p>
+          <a:p>
+            <a:pPr lvl="1"/>
+            <a:r>
+              <a:rPr lang="en-US" dirty="0" smtClean="0">
+                <a:latin typeface="Calibri" charset="0"/>
+                <a:ea typeface="ＭＳ Ｐゴシック" charset="0"/>
+              </a:rPr>
+              <a:t>All the complexity of the </a:t>
+            </a:r>
+            <a:r>
+              <a:rPr lang="en-US" dirty="0" err="1" smtClean="0">
+                <a:latin typeface="Calibri" charset="0"/>
+                <a:ea typeface="ＭＳ Ｐゴシック" charset="0"/>
+              </a:rPr>
+              <a:t>transcriptome</a:t>
+            </a:r>
+            <a:endParaRPr lang="en-US" dirty="0" smtClean="0">
+              <a:latin typeface="Calibri" charset="0"/>
+              <a:ea typeface="ＭＳ Ｐゴシック" charset="0"/>
+            </a:endParaRPr>
+          </a:p>
+          <a:p>
+            <a:pPr lvl="1"/>
+            <a:r>
+              <a:rPr lang="en-US" dirty="0" smtClean="0">
+                <a:latin typeface="Calibri" charset="0"/>
+                <a:ea typeface="ＭＳ Ｐゴシック" charset="0"/>
+              </a:rPr>
+              <a:t>Almost infinite number of potential features</a:t>
+            </a:r>
+          </a:p>
+          <a:p>
+            <a:pPr lvl="2"/>
+            <a:r>
+              <a:rPr lang="en-US" dirty="0" smtClean="0">
+                <a:latin typeface="Calibri" charset="0"/>
+                <a:ea typeface="ＭＳ Ｐゴシック" charset="0"/>
+              </a:rPr>
+              <a:t>Genes, transcripts, exons, junctions, retained introns, microRNAs, </a:t>
+            </a:r>
+            <a:r>
+              <a:rPr lang="en-US" dirty="0" err="1" smtClean="0">
+                <a:latin typeface="Calibri" charset="0"/>
+                <a:ea typeface="ＭＳ Ｐゴシック" charset="0"/>
+              </a:rPr>
+              <a:t>lncRNAs</a:t>
+            </a:r>
+            <a:r>
+              <a:rPr lang="en-US" dirty="0" smtClean="0">
+                <a:latin typeface="Calibri" charset="0"/>
+                <a:ea typeface="ＭＳ Ｐゴシック" charset="0"/>
+              </a:rPr>
+              <a:t>, </a:t>
+            </a:r>
+            <a:r>
+              <a:rPr lang="en-US" smtClean="0">
+                <a:latin typeface="Calibri" charset="0"/>
+                <a:ea typeface="ＭＳ Ｐゴシック" charset="0"/>
+              </a:rPr>
+              <a:t>etc</a:t>
+            </a:r>
+            <a:endParaRPr lang="en-US" dirty="0" smtClean="0">
+              <a:latin typeface="Calibri" charset="0"/>
+              <a:ea typeface="ＭＳ Ｐゴシック" charset="0"/>
+            </a:endParaRPr>
+          </a:p>
+          <a:p>
+            <a:r>
+              <a:rPr lang="en-US" dirty="0" err="1" smtClean="0">
+                <a:latin typeface="Calibri" charset="0"/>
+                <a:ea typeface="ＭＳ Ｐゴシック" charset="0"/>
+              </a:rPr>
+              <a:t>Bioconductor</a:t>
+            </a:r>
+            <a:r>
+              <a:rPr lang="en-US" dirty="0" smtClean="0">
+                <a:latin typeface="Calibri" charset="0"/>
+                <a:ea typeface="ＭＳ Ｐゴシック" charset="0"/>
+              </a:rPr>
+              <a:t> </a:t>
+            </a:r>
+            <a:r>
+              <a:rPr lang="en-US" dirty="0" err="1" smtClean="0">
+                <a:latin typeface="Calibri" charset="0"/>
+                <a:ea typeface="ＭＳ Ｐゴシック" charset="0"/>
+              </a:rPr>
+              <a:t>multtest</a:t>
+            </a:r>
+            <a:endParaRPr lang="en-US" dirty="0" smtClean="0">
+              <a:latin typeface="Calibri" charset="0"/>
+              <a:ea typeface="ＭＳ Ｐゴシック" charset="0"/>
+            </a:endParaRPr>
+          </a:p>
+          <a:p>
+            <a:pPr lvl="1"/>
+            <a:r>
+              <a:rPr lang="en-US" dirty="0" smtClean="0">
+                <a:latin typeface="Calibri" charset="0"/>
+                <a:ea typeface="ＭＳ Ｐゴシック" charset="0"/>
+                <a:hlinkClick r:id="rId2"/>
+              </a:rPr>
+              <a:t>http</a:t>
+            </a:r>
+            <a:r>
+              <a:rPr lang="en-US" dirty="0">
+                <a:latin typeface="Calibri" charset="0"/>
+                <a:ea typeface="ＭＳ Ｐゴシック" charset="0"/>
+                <a:hlinkClick r:id="rId2"/>
+              </a:rPr>
+              <a:t>://www.bioconductor.org/packages/release/bioc/</a:t>
+            </a:r>
+            <a:r>
+              <a:rPr lang="en-US" dirty="0" smtClean="0">
+                <a:latin typeface="Calibri" charset="0"/>
+                <a:ea typeface="ＭＳ Ｐゴシック" charset="0"/>
+                <a:hlinkClick r:id="rId2"/>
+              </a:rPr>
+              <a:t>html/multtest.html</a:t>
+            </a:r>
+            <a:endParaRPr lang="en-US" dirty="0">
+              <a:latin typeface="Calibri" charset="0"/>
+              <a:ea typeface="ＭＳ Ｐゴシック" charset="0"/>
+            </a:endParaRPr>
+          </a:p>
+        </p:txBody>
+      </p:sp>
+    </p:spTree>
+    <p:extLst>
+      <p:ext uri="{BB962C8B-B14F-4D97-AF65-F5344CB8AC3E}">
+        <p14:creationId xmlns:p14="http://schemas.microsoft.com/office/powerpoint/2010/main" val="1275607819"/>
+      </p:ext>
+    </p:extLst>
+  </p:cSld>
+  <p:clrMapOvr>
+    <a:masterClrMapping/>
+  </p:clrMapOvr>
+  <p:timing>
+    <p:tnLst>
+      <p:par>
+        <p:cTn xmlns:p14="http://schemas.microsoft.com/office/powerpoint/2010/main" id="1" dur="indefinite" restart="never" nodeType="tmRoot"/>
+      </p:par>
+    </p:tnLst>
+  </p:timing>
+</p:sld>
+</file>
+
+<file path=ppt/slides/slide23.xml><?xml version="1.0" encoding="utf-8"?>
+<p:sld xmlns:a="http://schemas.openxmlformats.org/drawingml/2006/main" xmlns:r="http://schemas.openxmlformats.org/officeDocument/2006/relationships" xmlns:p="http://schemas.openxmlformats.org/presentationml/2006/main">
+  <p:cSld>
+    <p:spTree>
+      <p:nvGrpSpPr>
+        <p:cNvPr id="1" name=""/>
+        <p:cNvGrpSpPr/>
+        <p:nvPr/>
+      </p:nvGrpSpPr>
+      <p:grpSpPr>
+        <a:xfrm>
+          <a:off x="0" y="0"/>
+          <a:ext cx="0" cy="0"/>
+          <a:chOff x="0" y="0"/>
+          <a:chExt cx="0" cy="0"/>
+        </a:xfrm>
+      </p:grpSpPr>
+      <p:sp>
+        <p:nvSpPr>
+          <p:cNvPr id="16385" name="Title 1"/>
+          <p:cNvSpPr>
+            <a:spLocks noGrp="1"/>
+          </p:cNvSpPr>
+          <p:nvPr>
+            <p:ph type="title"/>
+          </p:nvPr>
+        </p:nvSpPr>
+        <p:spPr>
+          <a:xfrm>
+            <a:off x="152400" y="44624"/>
+            <a:ext cx="8839200" cy="1143000"/>
+          </a:xfrm>
+        </p:spPr>
+        <p:txBody>
+          <a:bodyPr/>
+          <a:lstStyle/>
+          <a:p>
+            <a:r>
+              <a:rPr lang="en-US" sz="3600" dirty="0">
+                <a:latin typeface="Calibri" charset="0"/>
+                <a:ea typeface="ＭＳ Ｐゴシック" charset="0"/>
+              </a:rPr>
+              <a:t>Downstream interpretation of expression </a:t>
+            </a:r>
+            <a:r>
+              <a:rPr lang="en-US" sz="3600" dirty="0" smtClean="0">
+                <a:latin typeface="Calibri" charset="0"/>
+                <a:ea typeface="ＭＳ Ｐゴシック" charset="0"/>
+              </a:rPr>
+              <a:t>analysis</a:t>
+            </a:r>
+            <a:endParaRPr lang="en-US" sz="3600" dirty="0">
+              <a:latin typeface="Calibri" charset="0"/>
+              <a:ea typeface="ＭＳ Ｐゴシック" charset="0"/>
+            </a:endParaRPr>
+          </a:p>
+        </p:txBody>
+      </p:sp>
+      <p:sp>
+        <p:nvSpPr>
+          <p:cNvPr id="2" name="Content Placeholder 1"/>
+          <p:cNvSpPr>
+            <a:spLocks noGrp="1"/>
+          </p:cNvSpPr>
+          <p:nvPr>
+            <p:ph idx="1"/>
+          </p:nvPr>
+        </p:nvSpPr>
+        <p:spPr>
+          <a:xfrm>
+            <a:off x="152400" y="1484784"/>
+            <a:ext cx="8839200" cy="4896544"/>
+          </a:xfrm>
+        </p:spPr>
+        <p:txBody>
+          <a:bodyPr>
+            <a:normAutofit fontScale="62500" lnSpcReduction="20000"/>
+          </a:bodyPr>
+          <a:lstStyle/>
+          <a:p>
+            <a:r>
+              <a:rPr lang="en-US" dirty="0" smtClean="0">
+                <a:latin typeface="Calibri" charset="0"/>
+                <a:ea typeface="ＭＳ Ｐゴシック" charset="0"/>
+              </a:rPr>
+              <a:t>Topic for an entire course</a:t>
+            </a:r>
+          </a:p>
+          <a:p>
+            <a:r>
+              <a:rPr lang="en-US" dirty="0" smtClean="0">
+                <a:latin typeface="Calibri" charset="0"/>
+                <a:ea typeface="ＭＳ Ｐゴシック" charset="0"/>
+              </a:rPr>
+              <a:t>Expression estimates and differential expression lists from </a:t>
+            </a:r>
+            <a:r>
+              <a:rPr lang="en-US" dirty="0" err="1" smtClean="0">
+                <a:latin typeface="Calibri" charset="0"/>
+                <a:ea typeface="ＭＳ Ｐゴシック" charset="0"/>
+              </a:rPr>
+              <a:t>StringTie</a:t>
+            </a:r>
+            <a:r>
+              <a:rPr lang="en-US" dirty="0" smtClean="0">
+                <a:latin typeface="Calibri" charset="0"/>
+                <a:ea typeface="ＭＳ Ｐゴシック" charset="0"/>
+              </a:rPr>
+              <a:t>, </a:t>
+            </a:r>
+            <a:r>
+              <a:rPr lang="en-US" dirty="0" err="1" smtClean="0">
+                <a:latin typeface="Calibri" charset="0"/>
+                <a:ea typeface="ＭＳ Ｐゴシック" charset="0"/>
+              </a:rPr>
+              <a:t>Ballgown</a:t>
+            </a:r>
+            <a:r>
+              <a:rPr lang="en-US" dirty="0" smtClean="0">
+                <a:latin typeface="Calibri" charset="0"/>
+                <a:ea typeface="ＭＳ Ｐゴシック" charset="0"/>
+              </a:rPr>
+              <a:t> or other alternatives can be fed into many analysis pipelines</a:t>
+            </a:r>
+          </a:p>
+          <a:p>
+            <a:r>
+              <a:rPr lang="en-US" dirty="0" smtClean="0">
+                <a:latin typeface="Calibri" charset="0"/>
+                <a:ea typeface="ＭＳ Ｐゴシック" charset="0"/>
+              </a:rPr>
+              <a:t>See supplemental R tutorial for how to format expression data and start manipulating in R</a:t>
+            </a:r>
+            <a:endParaRPr lang="en-US" dirty="0">
+              <a:latin typeface="Calibri" charset="0"/>
+              <a:ea typeface="ＭＳ Ｐゴシック" charset="0"/>
+            </a:endParaRPr>
+          </a:p>
+          <a:p>
+            <a:r>
+              <a:rPr lang="en-US" dirty="0" smtClean="0">
+                <a:latin typeface="Calibri" charset="0"/>
+                <a:ea typeface="ＭＳ Ｐゴシック" charset="0"/>
+              </a:rPr>
+              <a:t>Clustering/</a:t>
+            </a:r>
+            <a:r>
+              <a:rPr lang="en-US" dirty="0" err="1" smtClean="0">
+                <a:latin typeface="Calibri" charset="0"/>
+                <a:ea typeface="ＭＳ Ｐゴシック" charset="0"/>
+              </a:rPr>
+              <a:t>Heatmaps</a:t>
+            </a:r>
+            <a:endParaRPr lang="en-US" dirty="0" smtClean="0">
+              <a:latin typeface="Calibri" charset="0"/>
+              <a:ea typeface="ＭＳ Ｐゴシック" charset="0"/>
+            </a:endParaRPr>
+          </a:p>
+          <a:p>
+            <a:pPr lvl="1"/>
+            <a:r>
+              <a:rPr lang="en-US" dirty="0" smtClean="0">
+                <a:latin typeface="Calibri" charset="0"/>
+                <a:ea typeface="ＭＳ Ｐゴシック" charset="0"/>
+              </a:rPr>
+              <a:t>Provided by </a:t>
+            </a:r>
+            <a:r>
+              <a:rPr lang="en-US" dirty="0" err="1" smtClean="0">
+                <a:latin typeface="Calibri" charset="0"/>
+                <a:ea typeface="ＭＳ Ｐゴシック" charset="0"/>
+              </a:rPr>
+              <a:t>cummeRbund</a:t>
+            </a:r>
+            <a:endParaRPr lang="en-US" dirty="0">
+              <a:latin typeface="Calibri" charset="0"/>
+              <a:ea typeface="ＭＳ Ｐゴシック" charset="0"/>
+            </a:endParaRPr>
+          </a:p>
+          <a:p>
+            <a:pPr lvl="1"/>
+            <a:r>
+              <a:rPr lang="en-US" dirty="0" smtClean="0">
+                <a:latin typeface="Calibri" charset="0"/>
+                <a:ea typeface="ＭＳ Ｐゴシック" charset="0"/>
+              </a:rPr>
+              <a:t>For more customized analysis various R packages exist: </a:t>
+            </a:r>
+          </a:p>
+          <a:p>
+            <a:pPr lvl="2"/>
+            <a:r>
+              <a:rPr lang="en-US" dirty="0" err="1">
+                <a:latin typeface="Calibri" charset="0"/>
+                <a:ea typeface="ＭＳ Ｐゴシック" charset="0"/>
+              </a:rPr>
+              <a:t>h</a:t>
+            </a:r>
+            <a:r>
+              <a:rPr lang="en-US" dirty="0" err="1" smtClean="0">
+                <a:latin typeface="Calibri" charset="0"/>
+                <a:ea typeface="ＭＳ Ｐゴシック" charset="0"/>
+              </a:rPr>
+              <a:t>clust</a:t>
+            </a:r>
+            <a:r>
+              <a:rPr lang="en-US" dirty="0" smtClean="0">
+                <a:latin typeface="Calibri" charset="0"/>
+                <a:ea typeface="ＭＳ Ｐゴシック" charset="0"/>
+              </a:rPr>
+              <a:t>, heatmap.2,</a:t>
+            </a:r>
+            <a:r>
+              <a:rPr lang="en-US" dirty="0">
+                <a:latin typeface="Calibri" charset="0"/>
+                <a:ea typeface="ＭＳ Ｐゴシック" charset="0"/>
+              </a:rPr>
+              <a:t> </a:t>
+            </a:r>
+            <a:r>
+              <a:rPr lang="en-US" dirty="0" err="1" smtClean="0">
+                <a:latin typeface="Calibri" charset="0"/>
+                <a:ea typeface="ＭＳ Ｐゴシック" charset="0"/>
+              </a:rPr>
+              <a:t>plotrix</a:t>
+            </a:r>
+            <a:r>
+              <a:rPr lang="en-US" dirty="0" smtClean="0">
+                <a:latin typeface="Calibri" charset="0"/>
+                <a:ea typeface="ＭＳ Ｐゴシック" charset="0"/>
+              </a:rPr>
+              <a:t>, ggplot2, etc.</a:t>
+            </a:r>
+          </a:p>
+          <a:p>
+            <a:r>
+              <a:rPr lang="en-US" dirty="0" smtClean="0">
+                <a:latin typeface="Calibri" charset="0"/>
+                <a:ea typeface="ＭＳ Ｐゴシック" charset="0"/>
+              </a:rPr>
+              <a:t>Classification</a:t>
+            </a:r>
+          </a:p>
+          <a:p>
+            <a:pPr lvl="1"/>
+            <a:r>
+              <a:rPr lang="en-US" dirty="0" smtClean="0">
+                <a:latin typeface="Calibri" charset="0"/>
+                <a:ea typeface="ＭＳ Ｐゴシック" charset="0"/>
+              </a:rPr>
+              <a:t>For RNA-seq data we still rarely have sufficient sample size and clinical details but this is changing</a:t>
+            </a:r>
+          </a:p>
+          <a:p>
+            <a:pPr lvl="2"/>
+            <a:r>
+              <a:rPr lang="en-US" dirty="0" err="1" smtClean="0">
+                <a:latin typeface="Calibri" charset="0"/>
+                <a:ea typeface="ＭＳ Ｐゴシック" charset="0"/>
+              </a:rPr>
+              <a:t>Weka</a:t>
+            </a:r>
+            <a:r>
+              <a:rPr lang="en-US" dirty="0" smtClean="0">
+                <a:latin typeface="Calibri" charset="0"/>
+                <a:ea typeface="ＭＳ Ｐゴシック" charset="0"/>
+              </a:rPr>
+              <a:t> is a good learning tool</a:t>
+            </a:r>
+          </a:p>
+          <a:p>
+            <a:pPr lvl="2"/>
+            <a:r>
+              <a:rPr lang="en-US" dirty="0" err="1" smtClean="0">
+                <a:latin typeface="Calibri" charset="0"/>
+                <a:ea typeface="ＭＳ Ｐゴシック" charset="0"/>
+              </a:rPr>
+              <a:t>RandomForests</a:t>
+            </a:r>
+            <a:r>
+              <a:rPr lang="en-US" dirty="0" smtClean="0">
+                <a:latin typeface="Calibri" charset="0"/>
+                <a:ea typeface="ＭＳ Ｐゴシック" charset="0"/>
+              </a:rPr>
+              <a:t> R package (</a:t>
+            </a:r>
+            <a:r>
+              <a:rPr lang="en-US" dirty="0" err="1" smtClean="0">
+                <a:latin typeface="Calibri" charset="0"/>
+                <a:ea typeface="ＭＳ Ｐゴシック" charset="0"/>
+              </a:rPr>
+              <a:t>biostar</a:t>
+            </a:r>
+            <a:r>
+              <a:rPr lang="en-US" dirty="0" smtClean="0">
+                <a:latin typeface="Calibri" charset="0"/>
+                <a:ea typeface="ＭＳ Ｐゴシック" charset="0"/>
+              </a:rPr>
+              <a:t> tutorial being developed)</a:t>
+            </a:r>
+          </a:p>
+          <a:p>
+            <a:r>
+              <a:rPr lang="en-US" dirty="0" smtClean="0">
+                <a:latin typeface="Calibri" charset="0"/>
+                <a:ea typeface="ＭＳ Ｐゴシック" charset="0"/>
+              </a:rPr>
+              <a:t>Pathway analysis</a:t>
+            </a:r>
+          </a:p>
+          <a:p>
+            <a:pPr lvl="1"/>
+            <a:r>
+              <a:rPr lang="en-US" dirty="0" smtClean="0">
+                <a:latin typeface="Calibri" charset="0"/>
+                <a:ea typeface="ＭＳ Ｐゴシック" charset="0"/>
+              </a:rPr>
+              <a:t>IPA</a:t>
+            </a:r>
+          </a:p>
+          <a:p>
+            <a:pPr lvl="1"/>
+            <a:r>
+              <a:rPr lang="en-US" dirty="0" err="1" smtClean="0">
+                <a:latin typeface="Calibri" charset="0"/>
+                <a:ea typeface="ＭＳ Ｐゴシック" charset="0"/>
+              </a:rPr>
+              <a:t>Cytoscape</a:t>
+            </a:r>
+            <a:endParaRPr lang="en-US" dirty="0" smtClean="0">
+              <a:latin typeface="Calibri" charset="0"/>
+              <a:ea typeface="ＭＳ Ｐゴシック" charset="0"/>
+            </a:endParaRPr>
+          </a:p>
+          <a:p>
+            <a:pPr lvl="1"/>
+            <a:r>
+              <a:rPr lang="en-US" dirty="0" smtClean="0">
+                <a:latin typeface="Calibri" charset="0"/>
+                <a:ea typeface="ＭＳ Ｐゴシック" charset="0"/>
+              </a:rPr>
+              <a:t>Many R/</a:t>
+            </a:r>
+            <a:r>
+              <a:rPr lang="en-US" dirty="0" err="1" smtClean="0">
+                <a:latin typeface="Calibri" charset="0"/>
+                <a:ea typeface="ＭＳ Ｐゴシック" charset="0"/>
+              </a:rPr>
+              <a:t>BioConductor</a:t>
+            </a:r>
+            <a:r>
+              <a:rPr lang="en-US" dirty="0">
+                <a:latin typeface="Calibri" charset="0"/>
+                <a:ea typeface="ＭＳ Ｐゴシック" charset="0"/>
+              </a:rPr>
+              <a:t> packages: </a:t>
+            </a:r>
+            <a:r>
+              <a:rPr lang="en-US" dirty="0">
+                <a:latin typeface="Calibri" charset="0"/>
+                <a:ea typeface="ＭＳ Ｐゴシック" charset="0"/>
+                <a:hlinkClick r:id="rId2"/>
+              </a:rPr>
+              <a:t>http://www.bioconductor.org/help/search/index.html?q=</a:t>
+            </a:r>
+            <a:r>
+              <a:rPr lang="en-US" dirty="0" smtClean="0">
+                <a:latin typeface="Calibri" charset="0"/>
+                <a:ea typeface="ＭＳ Ｐゴシック" charset="0"/>
+                <a:hlinkClick r:id="rId2"/>
+              </a:rPr>
+              <a:t>pathway</a:t>
+            </a:r>
+            <a:endParaRPr lang="en-US" dirty="0" smtClean="0">
+              <a:latin typeface="Calibri" charset="0"/>
+              <a:ea typeface="ＭＳ Ｐゴシック" charset="0"/>
+            </a:endParaRPr>
+          </a:p>
+          <a:p>
+            <a:pPr lvl="1"/>
+            <a:endParaRPr lang="en-US" dirty="0" smtClean="0">
+              <a:latin typeface="Calibri" charset="0"/>
+              <a:ea typeface="ＭＳ Ｐゴシック" charset="0"/>
+            </a:endParaRPr>
+          </a:p>
+        </p:txBody>
+      </p:sp>
+    </p:spTree>
+    <p:extLst>
+      <p:ext uri="{BB962C8B-B14F-4D97-AF65-F5344CB8AC3E}">
+        <p14:creationId xmlns:p14="http://schemas.microsoft.com/office/powerpoint/2010/main" val="4086693407"/>
+      </p:ext>
+    </p:extLst>
+  </p:cSld>
+  <p:clrMapOvr>
+    <a:masterClrMapping/>
+  </p:clrMapOvr>
+  <p:timing>
+    <p:tnLst>
+      <p:par>
+        <p:cTn xmlns:p14="http://schemas.microsoft.com/office/powerpoint/2010/main" id="1" dur="indefinite" restart="never" nodeType="tmRoot"/>
+      </p:par>
+    </p:tnLst>
+  </p:timing>
+</p:sld>
+</file>
+
+<file path=ppt/slides/slide24.xml><?xml version="1.0" encoding="utf-8"?>
+<p:sld xmlns:a="http://schemas.openxmlformats.org/drawingml/2006/main" xmlns:r="http://schemas.openxmlformats.org/officeDocument/2006/relationships" xmlns:p="http://schemas.openxmlformats.org/presentationml/2006/main">
+  <p:cSld>
+    <p:spTree>
+      <p:nvGrpSpPr>
+        <p:cNvPr id="1" name=""/>
+        <p:cNvGrpSpPr/>
+        <p:nvPr/>
+      </p:nvGrpSpPr>
+      <p:grpSpPr>
+        <a:xfrm>
+          <a:off x="0" y="0"/>
+          <a:ext cx="0" cy="0"/>
+          <a:chOff x="0" y="0"/>
+          <a:chExt cx="0" cy="0"/>
+        </a:xfrm>
+      </p:grpSpPr>
+      <p:sp>
+        <p:nvSpPr>
           <p:cNvPr id="17409" name="Content Placeholder 3"/>
           <p:cNvSpPr>
             <a:spLocks noGrp="1"/>
@@ -7582,7 +8583,7 @@
 </p:sld>
 </file>
 
-<file path=ppt/slides/slide22.xml><?xml version="1.0" encoding="utf-8"?>
+<file path=ppt/slides/slide25.xml><?xml version="1.0" encoding="utf-8"?>
 <p:sld xmlns:a="http://schemas.openxmlformats.org/drawingml/2006/main" xmlns:r="http://schemas.openxmlformats.org/officeDocument/2006/relationships" xmlns:p="http://schemas.openxmlformats.org/presentationml/2006/main">
   <p:cSld>
     <p:spTree>
@@ -10181,7 +11182,7 @@
 </p:sld>
 </file>
 
-<file path=ppt/slides/slide23.xml><?xml version="1.0" encoding="utf-8"?>
+<file path=ppt/slides/slide26.xml><?xml version="1.0" encoding="utf-8"?>
 <p:sld xmlns:a="http://schemas.openxmlformats.org/drawingml/2006/main" xmlns:r="http://schemas.openxmlformats.org/officeDocument/2006/relationships" xmlns:p="http://schemas.openxmlformats.org/presentationml/2006/main">
   <p:cSld>
     <p:spTree>
@@ -12305,15 +13306,7 @@
             <a:pPr lvl="2"/>
             <a:r>
               <a:rPr lang="en-US" dirty="0" smtClean="0"/>
-              <a:t>1) </a:t>
-            </a:r>
-            <a:r>
-              <a:rPr lang="en-US" dirty="0" smtClean="0"/>
-              <a:t>Determine total</a:t>
-            </a:r>
-            <a:r>
-              <a:rPr lang="en-US" dirty="0" smtClean="0"/>
-              <a:t> sample fragment count and divide by 1,000,000</a:t>
+              <a:t>1) Determine total sample fragment count and divide by 1,000,000</a:t>
             </a:r>
           </a:p>
           <a:p>
@@ -12322,21 +13315,12 @@
               <a:rPr lang="en-US" dirty="0" smtClean="0"/>
               <a:t>“per million” scaling factor</a:t>
             </a:r>
-            <a:endParaRPr lang="en-US" dirty="0" smtClean="0"/>
           </a:p>
           <a:p>
             <a:pPr lvl="2"/>
             <a:r>
               <a:rPr lang="en-US" dirty="0" smtClean="0"/>
-              <a:t>2) </a:t>
-            </a:r>
-            <a:r>
-              <a:rPr lang="en-US" dirty="0" smtClean="0"/>
-              <a:t>Divide each </a:t>
-            </a:r>
-            <a:r>
-              <a:rPr lang="en-US" dirty="0" smtClean="0"/>
-              <a:t>gene/transcript fragment count by #1</a:t>
+              <a:t>2) Divide each gene/transcript fragment count by #1</a:t>
             </a:r>
           </a:p>
           <a:p>
@@ -12350,19 +13334,11 @@
             <a:pPr lvl="2"/>
             <a:r>
               <a:rPr lang="en-US" dirty="0" smtClean="0"/>
-              <a:t>3) Divide </a:t>
+              <a:t>3) Divide each FPM by length of each </a:t>
             </a:r>
             <a:r>
               <a:rPr lang="en-US" dirty="0" smtClean="0"/>
-              <a:t>each FPM </a:t>
-            </a:r>
-            <a:r>
-              <a:rPr lang="en-US" dirty="0" smtClean="0"/>
-              <a:t>by length of </a:t>
-            </a:r>
-            <a:r>
-              <a:rPr lang="en-US" dirty="0" smtClean="0"/>
-              <a:t>each gene </a:t>
+              <a:t>gene/transcript </a:t>
             </a:r>
             <a:r>
               <a:rPr lang="en-US" dirty="0" smtClean="0"/>
@@ -12396,19 +13372,15 @@
             <a:pPr lvl="2"/>
             <a:r>
               <a:rPr lang="en-US" dirty="0" smtClean="0"/>
-              <a:t>1) Divide </a:t>
+              <a:t>1) Divide each fragment count by length of each </a:t>
             </a:r>
             <a:r>
               <a:rPr lang="en-US" dirty="0" smtClean="0"/>
-              <a:t>each fragment </a:t>
-            </a:r>
-            <a:r>
-              <a:rPr lang="en-US" dirty="0" smtClean="0"/>
-              <a:t>count by length of </a:t>
-            </a:r>
-            <a:r>
-              <a:rPr lang="en-US" dirty="0" smtClean="0"/>
-              <a:t>each transcript</a:t>
+              <a:t>transcript in </a:t>
+            </a:r>
+            <a:r>
+              <a:rPr lang="en-US" dirty="0" err="1" smtClean="0"/>
+              <a:t>kilobases</a:t>
             </a:r>
             <a:endParaRPr lang="en-US" dirty="0" smtClean="0"/>
           </a:p>
@@ -12435,11 +13407,7 @@
             <a:pPr lvl="2"/>
             <a:r>
               <a:rPr lang="en-US" dirty="0" smtClean="0"/>
-              <a:t>2) Sum all FPK </a:t>
-            </a:r>
-            <a:r>
-              <a:rPr lang="en-US" dirty="0" smtClean="0"/>
-              <a:t>values for the sample and divide by 1,000,000</a:t>
+              <a:t>2) Sum all FPK values for the sample and divide by 1,000,000</a:t>
             </a:r>
           </a:p>
           <a:p>
@@ -12448,21 +13416,12 @@
               <a:rPr lang="en-US" dirty="0" smtClean="0"/>
               <a:t>“per million” scaling factor</a:t>
             </a:r>
-            <a:endParaRPr lang="en-US" dirty="0" smtClean="0"/>
           </a:p>
           <a:p>
             <a:pPr lvl="2"/>
             <a:r>
               <a:rPr lang="en-US" dirty="0" smtClean="0"/>
-              <a:t>3) Divide #1 by </a:t>
-            </a:r>
-            <a:r>
-              <a:rPr lang="en-US" dirty="0" smtClean="0"/>
-              <a:t>#2 </a:t>
-            </a:r>
-            <a:r>
-              <a:rPr lang="en-US" dirty="0" smtClean="0"/>
-              <a:t>(TPM)</a:t>
+              <a:t>3) Divide #1 by #2 (TPM)</a:t>
             </a:r>
           </a:p>
           <a:p>
@@ -12538,6 +13497,13 @@
   <p:clrMapOvr>
     <a:masterClrMapping/>
   </p:clrMapOvr>
+  <p:timing>
+    <p:tnLst>
+      <p:par>
+        <p:cTn xmlns:p14="http://schemas.microsoft.com/office/powerpoint/2010/main" id="1" dur="indefinite" restart="never" nodeType="tmRoot"/>
+      </p:par>
+    </p:tnLst>
+  </p:timing>
 </p:sld>
 </file>
 
@@ -12570,7 +13536,7 @@
         </p:nvSpPr>
         <p:spPr>
           <a:xfrm>
-            <a:off x="152400" y="274638"/>
+            <a:off x="152400" y="44624"/>
             <a:ext cx="8839200" cy="490066"/>
           </a:xfrm>
         </p:spPr>
@@ -12617,8 +13583,8 @@
         </p:blipFill>
         <p:spPr>
           <a:xfrm>
-            <a:off x="1331640" y="980728"/>
-            <a:ext cx="9155867" cy="4893653"/>
+            <a:off x="1403648" y="1019215"/>
+            <a:ext cx="9083859" cy="4855166"/>
           </a:xfrm>
         </p:spPr>
       </p:pic>
@@ -12630,8 +13596,8 @@
         </p:nvSpPr>
         <p:spPr>
           <a:xfrm>
-            <a:off x="3723" y="764704"/>
-            <a:ext cx="2987824" cy="5355313"/>
+            <a:off x="3723" y="1535881"/>
+            <a:ext cx="2840085" cy="3693319"/>
           </a:xfrm>
           <a:prstGeom prst="rect">
             <a:avLst/>
@@ -12644,10 +13610,6 @@
           </a:bodyPr>
           <a:lstStyle/>
           <a:p>
-            <a:pPr marL="285750" indent="-285750">
-              <a:buFont typeface="Arial"/>
-              <a:buChar char="•"/>
-            </a:pPr>
             <a:r>
               <a:rPr lang="en-US" sz="1800" dirty="0" err="1"/>
               <a:t>StringTie</a:t>
@@ -12657,16 +13619,6 @@
               <a:t> iteratively extracts the heaviest path from a splice graph, constructs a flow network, computes maximum flow to estimate abundance, and then updates the splice graph by removing reads that were assigned by the flow algorithm. This process repeats until all reads have been assigned. </a:t>
             </a:r>
             <a:endParaRPr lang="en-US" sz="1800" dirty="0" smtClean="0"/>
-          </a:p>
-          <a:p>
-            <a:pPr marL="285750" indent="-285750">
-              <a:buFont typeface="Arial"/>
-              <a:buChar char="•"/>
-            </a:pPr>
-            <a:r>
-              <a:rPr lang="en-US" sz="1800" dirty="0"/>
-              <a:t>Annotated transcript T for which read data covers only the fragments F1 and F2. </a:t>
-            </a:r>
           </a:p>
         </p:txBody>
       </p:sp>
@@ -12708,6 +13660,36 @@
           </a:p>
         </p:txBody>
       </p:sp>
+      <p:sp>
+        <p:nvSpPr>
+          <p:cNvPr id="5" name="TextBox 4"/>
+          <p:cNvSpPr txBox="1"/>
+          <p:nvPr/>
+        </p:nvSpPr>
+        <p:spPr>
+          <a:xfrm>
+            <a:off x="7308304" y="2060848"/>
+            <a:ext cx="1440160" cy="523220"/>
+          </a:xfrm>
+          <a:prstGeom prst="rect">
+            <a:avLst/>
+          </a:prstGeom>
+          <a:noFill/>
+        </p:spPr>
+        <p:txBody>
+          <a:bodyPr wrap="square" rtlCol="0">
+            <a:spAutoFit/>
+          </a:bodyPr>
+          <a:lstStyle/>
+          <a:p>
+            <a:r>
+              <a:rPr lang="en-US" sz="1400" dirty="0" smtClean="0"/>
+              <a:t>Group reads into clusters</a:t>
+            </a:r>
+            <a:endParaRPr lang="en-US" sz="1400" dirty="0"/>
+          </a:p>
+        </p:txBody>
+      </p:sp>
     </p:spTree>
     <p:extLst>
       <p:ext uri="{BB962C8B-B14F-4D97-AF65-F5344CB8AC3E}">
@@ -12718,6 +13700,13 @@
   <p:clrMapOvr>
     <a:masterClrMapping/>
   </p:clrMapOvr>
+  <p:timing>
+    <p:tnLst>
+      <p:par>
+        <p:cTn xmlns:p14="http://schemas.microsoft.com/office/powerpoint/2010/main" id="1" dur="indefinite" restart="never" nodeType="tmRoot"/>
+      </p:par>
+    </p:tnLst>
+  </p:timing>
 </p:sld>
 </file>
 

</xml_diff>

<commit_message>
added notes and resources related to TPM vs FPKM
</commit_message>
<xml_diff>
--- a/LectureFiles/cbw/2017/RNASeq_Module3_Lecture.pptx
+++ b/LectureFiles/cbw/2017/RNASeq_Module3_Lecture.pptx
@@ -1316,11 +1316,7 @@
             </a:pPr>
             <a:r>
               <a:rPr lang="en-US" dirty="0" smtClean="0"/>
-              <a:t>Overview </a:t>
-            </a:r>
-            <a:r>
-              <a:rPr lang="en-US" dirty="0" smtClean="0"/>
-              <a:t>of the flow of the </a:t>
+              <a:t>Overview of the flow of the </a:t>
             </a:r>
             <a:r>
               <a:rPr lang="en-US" dirty="0" err="1" smtClean="0"/>
@@ -1338,7 +1334,6 @@
               <a:rPr lang="en-US" dirty="0" smtClean="0"/>
               <a:t>. </a:t>
             </a:r>
-            <a:endParaRPr lang="en-US" dirty="0" smtClean="0"/>
           </a:p>
           <a:p>
             <a:pPr marL="228600" indent="-228600">
@@ -1352,11 +1347,7 @@
             </a:pPr>
             <a:r>
               <a:rPr lang="en-US" dirty="0" smtClean="0"/>
-              <a:t>All </a:t>
-            </a:r>
-            <a:r>
-              <a:rPr lang="en-US" dirty="0" smtClean="0"/>
-              <a:t>methods begin with a set of RNA-</a:t>
+              <a:t>All methods begin with a set of RNA-</a:t>
             </a:r>
             <a:r>
               <a:rPr lang="en-US" dirty="0" err="1" smtClean="0"/>
@@ -1404,23 +1395,7 @@
             </a:r>
             <a:r>
               <a:rPr lang="en-US" dirty="0" smtClean="0"/>
-              <a:t> </a:t>
-            </a:r>
-            <a:r>
-              <a:rPr lang="en-US" dirty="0" smtClean="0"/>
-              <a:t>iteratively extracts the heaviest path from </a:t>
-            </a:r>
-            <a:r>
-              <a:rPr lang="en-US" dirty="0" smtClean="0"/>
-              <a:t>the </a:t>
-            </a:r>
-            <a:r>
-              <a:rPr lang="en-US" dirty="0" smtClean="0"/>
-              <a:t>splice graph, constructs a flow network, computes maximum flow to estimate abundance, and then updates the splice graph by removing reads that were assigned by the flow algorithm. This process repeats until all reads have been assigned</a:t>
-            </a:r>
-            <a:r>
-              <a:rPr lang="en-US" dirty="0" smtClean="0"/>
-              <a:t>.</a:t>
+              <a:t> iteratively extracts the heaviest path from the splice graph, constructs a flow network, computes maximum flow to estimate abundance, and then updates the splice graph by removing reads that were assigned by the flow algorithm. This process repeats until all reads have been assigned.</a:t>
             </a:r>
           </a:p>
           <a:p>
@@ -13272,7 +13247,7 @@
         </p:spPr>
         <p:txBody>
           <a:bodyPr>
-            <a:normAutofit fontScale="92500" lnSpcReduction="10000"/>
+            <a:normAutofit fontScale="85000" lnSpcReduction="20000"/>
           </a:bodyPr>
           <a:lstStyle/>
           <a:p>
@@ -13334,15 +13309,7 @@
             <a:pPr lvl="2"/>
             <a:r>
               <a:rPr lang="en-US" dirty="0" smtClean="0"/>
-              <a:t>3) Divide each FPM by length of each </a:t>
-            </a:r>
-            <a:r>
-              <a:rPr lang="en-US" dirty="0" smtClean="0"/>
-              <a:t>gene/transcript </a:t>
-            </a:r>
-            <a:r>
-              <a:rPr lang="en-US" dirty="0" smtClean="0"/>
-              <a:t>in </a:t>
+              <a:t>3) Divide each FPM by length of each gene/transcript in </a:t>
             </a:r>
             <a:r>
               <a:rPr lang="en-US" dirty="0" err="1" smtClean="0"/>
@@ -13372,11 +13339,7 @@
             <a:pPr lvl="2"/>
             <a:r>
               <a:rPr lang="en-US" dirty="0" smtClean="0"/>
-              <a:t>1) Divide each fragment count by length of each </a:t>
-            </a:r>
-            <a:r>
-              <a:rPr lang="en-US" dirty="0" smtClean="0"/>
-              <a:t>transcript in </a:t>
+              <a:t>1) Divide each fragment count by length of each transcript in </a:t>
             </a:r>
             <a:r>
               <a:rPr lang="en-US" dirty="0" err="1" smtClean="0"/>
@@ -13421,69 +13384,89 @@
             <a:pPr lvl="2"/>
             <a:r>
               <a:rPr lang="en-US" dirty="0" smtClean="0"/>
-              <a:t>3) Divide #1 by #2 (TPM)</a:t>
-            </a:r>
-          </a:p>
-          <a:p>
+              <a:t>3) Divide #1 by #2 (TPM</a:t>
+            </a:r>
+            <a:r>
+              <a:rPr lang="en-US" dirty="0" smtClean="0"/>
+              <a:t>)</a:t>
+            </a:r>
+          </a:p>
+          <a:p>
+            <a:pPr lvl="2"/>
+            <a:endParaRPr lang="en-US" dirty="0" smtClean="0"/>
+          </a:p>
+          <a:p>
+            <a:r>
+              <a:rPr lang="en-US" sz="2100" dirty="0" smtClean="0"/>
+              <a:t>The </a:t>
+            </a:r>
+            <a:r>
+              <a:rPr lang="en-US" sz="2100" dirty="0"/>
+              <a:t>sum of all TPMs in each sample </a:t>
+            </a:r>
+            <a:r>
+              <a:rPr lang="en-US" sz="2100" dirty="0" smtClean="0"/>
+              <a:t>is </a:t>
+            </a:r>
+            <a:r>
+              <a:rPr lang="en-US" sz="2100" dirty="0"/>
+              <a:t>the same. </a:t>
+            </a:r>
+            <a:r>
+              <a:rPr lang="en-US" sz="2100" dirty="0" smtClean="0"/>
+              <a:t>Easier </a:t>
+            </a:r>
+            <a:r>
+              <a:rPr lang="en-US" sz="2100" dirty="0"/>
+              <a:t>to compare </a:t>
+            </a:r>
+            <a:r>
+              <a:rPr lang="en-US" sz="2100" dirty="0" smtClean="0"/>
+              <a:t>across samples!</a:t>
+            </a:r>
+            <a:endParaRPr lang="en-US" sz="2100" dirty="0" smtClean="0">
+              <a:hlinkClick r:id="rId3"/>
+            </a:endParaRPr>
+          </a:p>
+          <a:p>
+            <a:r>
+              <a:rPr lang="en-US" sz="1800" dirty="0" smtClean="0">
+                <a:hlinkClick r:id="rId3"/>
+              </a:rPr>
+              <a:t>http</a:t>
+            </a:r>
             <a:r>
               <a:rPr lang="en-US" sz="1800" dirty="0">
                 <a:hlinkClick r:id="rId3"/>
               </a:rPr>
-              <a:t>http://</a:t>
-            </a:r>
-            <a:r>
-              <a:rPr lang="en-US" sz="1800" dirty="0" err="1">
+              <a:t>://www.rna-seqblog.com/rpkm-fpkm-and-tpm-clearly-explained</a:t>
+            </a:r>
+            <a:r>
+              <a:rPr lang="en-US" sz="1800" dirty="0" smtClean="0">
                 <a:hlinkClick r:id="rId3"/>
               </a:rPr>
-              <a:t>www.rna-seqblog.com</a:t>
-            </a:r>
+              <a:t>/</a:t>
+            </a:r>
+            <a:endParaRPr lang="en-US" sz="1800" dirty="0" smtClean="0"/>
+          </a:p>
+          <a:p>
             <a:r>
               <a:rPr lang="en-US" sz="1800" dirty="0">
-                <a:hlinkClick r:id="rId3"/>
-              </a:rPr>
-              <a:t>/</a:t>
-            </a:r>
-            <a:r>
-              <a:rPr lang="en-US" sz="1800" dirty="0" err="1">
-                <a:hlinkClick r:id="rId3"/>
-              </a:rPr>
-              <a:t>rpkm</a:t>
-            </a:r>
-            <a:r>
-              <a:rPr lang="en-US" sz="1800" dirty="0">
-                <a:hlinkClick r:id="rId3"/>
-              </a:rPr>
-              <a:t>-</a:t>
-            </a:r>
-            <a:r>
-              <a:rPr lang="en-US" sz="1800" dirty="0" err="1">
-                <a:hlinkClick r:id="rId3"/>
-              </a:rPr>
-              <a:t>fpkm</a:t>
-            </a:r>
-            <a:r>
-              <a:rPr lang="en-US" sz="1800" dirty="0">
-                <a:hlinkClick r:id="rId3"/>
-              </a:rPr>
-              <a:t>-and-</a:t>
-            </a:r>
-            <a:r>
-              <a:rPr lang="en-US" sz="1800" dirty="0" err="1">
-                <a:hlinkClick r:id="rId3"/>
-              </a:rPr>
-              <a:t>tpm</a:t>
-            </a:r>
-            <a:r>
-              <a:rPr lang="en-US" sz="1800" dirty="0">
-                <a:hlinkClick r:id="rId3"/>
-              </a:rPr>
-              <a:t>-clearly-explained/</a:t>
+                <a:hlinkClick r:id="rId4"/>
+              </a:rPr>
+              <a:t>https://www.ncbi.nlm.nih.gov/pubmed/</a:t>
+            </a:r>
+            <a:r>
+              <a:rPr lang="en-US" sz="1800" dirty="0" smtClean="0">
+                <a:hlinkClick r:id="rId4"/>
+              </a:rPr>
+              <a:t>22872506</a:t>
+            </a:r>
+            <a:r>
+              <a:rPr lang="en-US" sz="1800" dirty="0" smtClean="0"/>
+              <a:t> </a:t>
             </a:r>
             <a:endParaRPr lang="en-US" sz="1800" dirty="0" smtClean="0"/>
-          </a:p>
-          <a:p>
-            <a:pPr lvl="2"/>
-            <a:endParaRPr lang="en-US" dirty="0" smtClean="0"/>
           </a:p>
         </p:txBody>
       </p:sp>

</xml_diff>